<commit_message>
sigcse handout and demo
</commit_message>
<xml_diff>
--- a/docsrc/_static/pedal-overview.pptx
+++ b/docsrc/_static/pedal-overview.pptx
@@ -256,7 +256,7 @@
           <a:p>
             <a:fld id="{3A979BF9-124F-4BB9-ADB5-5719B90CB8FD}" type="datetimeFigureOut">
               <a:rPr lang="en-US" smtClean="0"/>
-              <a:t>1/21/2019</a:t>
+              <a:t>3/10/2020</a:t>
             </a:fld>
             <a:endParaRPr lang="en-US"/>
           </a:p>
@@ -426,7 +426,7 @@
           <a:p>
             <a:fld id="{3A979BF9-124F-4BB9-ADB5-5719B90CB8FD}" type="datetimeFigureOut">
               <a:rPr lang="en-US" smtClean="0"/>
-              <a:t>1/21/2019</a:t>
+              <a:t>3/10/2020</a:t>
             </a:fld>
             <a:endParaRPr lang="en-US"/>
           </a:p>
@@ -606,7 +606,7 @@
           <a:p>
             <a:fld id="{3A979BF9-124F-4BB9-ADB5-5719B90CB8FD}" type="datetimeFigureOut">
               <a:rPr lang="en-US" smtClean="0"/>
-              <a:t>1/21/2019</a:t>
+              <a:t>3/10/2020</a:t>
             </a:fld>
             <a:endParaRPr lang="en-US"/>
           </a:p>
@@ -776,7 +776,7 @@
           <a:p>
             <a:fld id="{3A979BF9-124F-4BB9-ADB5-5719B90CB8FD}" type="datetimeFigureOut">
               <a:rPr lang="en-US" smtClean="0"/>
-              <a:t>1/21/2019</a:t>
+              <a:t>3/10/2020</a:t>
             </a:fld>
             <a:endParaRPr lang="en-US"/>
           </a:p>
@@ -1020,7 +1020,7 @@
           <a:p>
             <a:fld id="{3A979BF9-124F-4BB9-ADB5-5719B90CB8FD}" type="datetimeFigureOut">
               <a:rPr lang="en-US" smtClean="0"/>
-              <a:t>1/21/2019</a:t>
+              <a:t>3/10/2020</a:t>
             </a:fld>
             <a:endParaRPr lang="en-US"/>
           </a:p>
@@ -1252,7 +1252,7 @@
           <a:p>
             <a:fld id="{3A979BF9-124F-4BB9-ADB5-5719B90CB8FD}" type="datetimeFigureOut">
               <a:rPr lang="en-US" smtClean="0"/>
-              <a:t>1/21/2019</a:t>
+              <a:t>3/10/2020</a:t>
             </a:fld>
             <a:endParaRPr lang="en-US"/>
           </a:p>
@@ -1619,7 +1619,7 @@
           <a:p>
             <a:fld id="{3A979BF9-124F-4BB9-ADB5-5719B90CB8FD}" type="datetimeFigureOut">
               <a:rPr lang="en-US" smtClean="0"/>
-              <a:t>1/21/2019</a:t>
+              <a:t>3/10/2020</a:t>
             </a:fld>
             <a:endParaRPr lang="en-US"/>
           </a:p>
@@ -1737,7 +1737,7 @@
           <a:p>
             <a:fld id="{3A979BF9-124F-4BB9-ADB5-5719B90CB8FD}" type="datetimeFigureOut">
               <a:rPr lang="en-US" smtClean="0"/>
-              <a:t>1/21/2019</a:t>
+              <a:t>3/10/2020</a:t>
             </a:fld>
             <a:endParaRPr lang="en-US"/>
           </a:p>
@@ -1832,7 +1832,7 @@
           <a:p>
             <a:fld id="{3A979BF9-124F-4BB9-ADB5-5719B90CB8FD}" type="datetimeFigureOut">
               <a:rPr lang="en-US" smtClean="0"/>
-              <a:t>1/21/2019</a:t>
+              <a:t>3/10/2020</a:t>
             </a:fld>
             <a:endParaRPr lang="en-US"/>
           </a:p>
@@ -2109,7 +2109,7 @@
           <a:p>
             <a:fld id="{3A979BF9-124F-4BB9-ADB5-5719B90CB8FD}" type="datetimeFigureOut">
               <a:rPr lang="en-US" smtClean="0"/>
-              <a:t>1/21/2019</a:t>
+              <a:t>3/10/2020</a:t>
             </a:fld>
             <a:endParaRPr lang="en-US"/>
           </a:p>
@@ -2366,7 +2366,7 @@
           <a:p>
             <a:fld id="{3A979BF9-124F-4BB9-ADB5-5719B90CB8FD}" type="datetimeFigureOut">
               <a:rPr lang="en-US" smtClean="0"/>
-              <a:t>1/21/2019</a:t>
+              <a:t>3/10/2020</a:t>
             </a:fld>
             <a:endParaRPr lang="en-US"/>
           </a:p>
@@ -2579,7 +2579,7 @@
           <a:p>
             <a:fld id="{3A979BF9-124F-4BB9-ADB5-5719B90CB8FD}" type="datetimeFigureOut">
               <a:rPr lang="en-US" smtClean="0"/>
-              <a:t>1/21/2019</a:t>
+              <a:t>3/10/2020</a:t>
             </a:fld>
             <a:endParaRPr lang="en-US"/>
           </a:p>

</xml_diff>

<commit_message>
New version of explanatory diagram.
</commit_message>
<xml_diff>
--- a/docsrc/_static/pedal-overview.pptx
+++ b/docsrc/_static/pedal-overview.pptx
@@ -6,8 +6,9 @@
   </p:sldMasterIdLst>
   <p:sldIdLst>
     <p:sldId id="258" r:id="rId2"/>
-    <p:sldId id="256" r:id="rId3"/>
-    <p:sldId id="257" r:id="rId4"/>
+    <p:sldId id="259" r:id="rId3"/>
+    <p:sldId id="256" r:id="rId4"/>
+    <p:sldId id="257" r:id="rId5"/>
   </p:sldIdLst>
   <p:sldSz cx="6858000" cy="9144000" type="letter"/>
   <p:notesSz cx="6858000" cy="9144000"/>
@@ -256,7 +257,7 @@
           <a:p>
             <a:fld id="{3A979BF9-124F-4BB9-ADB5-5719B90CB8FD}" type="datetimeFigureOut">
               <a:rPr lang="en-US" smtClean="0"/>
-              <a:t>3/10/2020</a:t>
+              <a:t>10/17/2020</a:t>
             </a:fld>
             <a:endParaRPr lang="en-US"/>
           </a:p>
@@ -426,7 +427,7 @@
           <a:p>
             <a:fld id="{3A979BF9-124F-4BB9-ADB5-5719B90CB8FD}" type="datetimeFigureOut">
               <a:rPr lang="en-US" smtClean="0"/>
-              <a:t>3/10/2020</a:t>
+              <a:t>10/17/2020</a:t>
             </a:fld>
             <a:endParaRPr lang="en-US"/>
           </a:p>
@@ -606,7 +607,7 @@
           <a:p>
             <a:fld id="{3A979BF9-124F-4BB9-ADB5-5719B90CB8FD}" type="datetimeFigureOut">
               <a:rPr lang="en-US" smtClean="0"/>
-              <a:t>3/10/2020</a:t>
+              <a:t>10/17/2020</a:t>
             </a:fld>
             <a:endParaRPr lang="en-US"/>
           </a:p>
@@ -776,7 +777,7 @@
           <a:p>
             <a:fld id="{3A979BF9-124F-4BB9-ADB5-5719B90CB8FD}" type="datetimeFigureOut">
               <a:rPr lang="en-US" smtClean="0"/>
-              <a:t>3/10/2020</a:t>
+              <a:t>10/17/2020</a:t>
             </a:fld>
             <a:endParaRPr lang="en-US"/>
           </a:p>
@@ -1020,7 +1021,7 @@
           <a:p>
             <a:fld id="{3A979BF9-124F-4BB9-ADB5-5719B90CB8FD}" type="datetimeFigureOut">
               <a:rPr lang="en-US" smtClean="0"/>
-              <a:t>3/10/2020</a:t>
+              <a:t>10/17/2020</a:t>
             </a:fld>
             <a:endParaRPr lang="en-US"/>
           </a:p>
@@ -1252,7 +1253,7 @@
           <a:p>
             <a:fld id="{3A979BF9-124F-4BB9-ADB5-5719B90CB8FD}" type="datetimeFigureOut">
               <a:rPr lang="en-US" smtClean="0"/>
-              <a:t>3/10/2020</a:t>
+              <a:t>10/17/2020</a:t>
             </a:fld>
             <a:endParaRPr lang="en-US"/>
           </a:p>
@@ -1619,7 +1620,7 @@
           <a:p>
             <a:fld id="{3A979BF9-124F-4BB9-ADB5-5719B90CB8FD}" type="datetimeFigureOut">
               <a:rPr lang="en-US" smtClean="0"/>
-              <a:t>3/10/2020</a:t>
+              <a:t>10/17/2020</a:t>
             </a:fld>
             <a:endParaRPr lang="en-US"/>
           </a:p>
@@ -1737,7 +1738,7 @@
           <a:p>
             <a:fld id="{3A979BF9-124F-4BB9-ADB5-5719B90CB8FD}" type="datetimeFigureOut">
               <a:rPr lang="en-US" smtClean="0"/>
-              <a:t>3/10/2020</a:t>
+              <a:t>10/17/2020</a:t>
             </a:fld>
             <a:endParaRPr lang="en-US"/>
           </a:p>
@@ -1832,7 +1833,7 @@
           <a:p>
             <a:fld id="{3A979BF9-124F-4BB9-ADB5-5719B90CB8FD}" type="datetimeFigureOut">
               <a:rPr lang="en-US" smtClean="0"/>
-              <a:t>3/10/2020</a:t>
+              <a:t>10/17/2020</a:t>
             </a:fld>
             <a:endParaRPr lang="en-US"/>
           </a:p>
@@ -2109,7 +2110,7 @@
           <a:p>
             <a:fld id="{3A979BF9-124F-4BB9-ADB5-5719B90CB8FD}" type="datetimeFigureOut">
               <a:rPr lang="en-US" smtClean="0"/>
-              <a:t>3/10/2020</a:t>
+              <a:t>10/17/2020</a:t>
             </a:fld>
             <a:endParaRPr lang="en-US"/>
           </a:p>
@@ -2366,7 +2367,7 @@
           <a:p>
             <a:fld id="{3A979BF9-124F-4BB9-ADB5-5719B90CB8FD}" type="datetimeFigureOut">
               <a:rPr lang="en-US" smtClean="0"/>
-              <a:t>3/10/2020</a:t>
+              <a:t>10/17/2020</a:t>
             </a:fld>
             <a:endParaRPr lang="en-US"/>
           </a:p>
@@ -2579,7 +2580,7 @@
           <a:p>
             <a:fld id="{3A979BF9-124F-4BB9-ADB5-5719B90CB8FD}" type="datetimeFigureOut">
               <a:rPr lang="en-US" smtClean="0"/>
-              <a:t>3/10/2020</a:t>
+              <a:t>10/17/2020</a:t>
             </a:fld>
             <a:endParaRPr lang="en-US"/>
           </a:p>
@@ -2968,6 +2969,3900 @@
 </file>
 
 <file path=ppt/slides/slide1.xml><?xml version="1.0" encoding="utf-8"?>
+<p:sld xmlns:a="http://schemas.openxmlformats.org/drawingml/2006/main" xmlns:r="http://schemas.openxmlformats.org/officeDocument/2006/relationships" xmlns:p="http://schemas.openxmlformats.org/presentationml/2006/main">
+  <p:cSld>
+    <p:spTree>
+      <p:nvGrpSpPr>
+        <p:cNvPr id="1" name=""/>
+        <p:cNvGrpSpPr/>
+        <p:nvPr/>
+      </p:nvGrpSpPr>
+      <p:grpSpPr>
+        <a:xfrm>
+          <a:off x="0" y="0"/>
+          <a:ext cx="0" cy="0"/>
+          <a:chOff x="0" y="0"/>
+          <a:chExt cx="0" cy="0"/>
+        </a:xfrm>
+      </p:grpSpPr>
+      <p:sp>
+        <p:nvSpPr>
+          <p:cNvPr id="206" name="Rectangle 205">
+            <a:extLst>
+              <a:ext uri="{FF2B5EF4-FFF2-40B4-BE49-F238E27FC236}">
+                <a16:creationId xmlns:a16="http://schemas.microsoft.com/office/drawing/2014/main" id="{B821EBA2-37F9-4C6A-B78A-CF4F50C55178}"/>
+              </a:ext>
+            </a:extLst>
+          </p:cNvPr>
+          <p:cNvSpPr/>
+          <p:nvPr/>
+        </p:nvSpPr>
+        <p:spPr>
+          <a:xfrm>
+            <a:off x="2805619" y="2320287"/>
+            <a:ext cx="3119380" cy="2132300"/>
+          </a:xfrm>
+          <a:prstGeom prst="rect">
+            <a:avLst/>
+          </a:prstGeom>
+          <a:ln>
+            <a:solidFill>
+              <a:schemeClr val="accent1"/>
+            </a:solidFill>
+            <a:prstDash val="sysDot"/>
+          </a:ln>
+        </p:spPr>
+        <p:style>
+          <a:lnRef idx="2">
+            <a:schemeClr val="dk1"/>
+          </a:lnRef>
+          <a:fillRef idx="1">
+            <a:schemeClr val="lt1"/>
+          </a:fillRef>
+          <a:effectRef idx="0">
+            <a:schemeClr val="dk1"/>
+          </a:effectRef>
+          <a:fontRef idx="minor">
+            <a:schemeClr val="dk1"/>
+          </a:fontRef>
+        </p:style>
+        <p:txBody>
+          <a:bodyPr rtlCol="0" anchor="t"/>
+          <a:lstStyle/>
+          <a:p>
+            <a:r>
+              <a:rPr lang="en-US" sz="1200" b="1" dirty="0">
+                <a:latin typeface="Arial" panose="020B0604020202020204" pitchFamily="34" charset="0"/>
+                <a:cs typeface="Arial" panose="020B0604020202020204" pitchFamily="34" charset="0"/>
+              </a:rPr>
+              <a:t>Core API</a:t>
+            </a:r>
+          </a:p>
+        </p:txBody>
+      </p:sp>
+      <p:grpSp>
+        <p:nvGrpSpPr>
+          <p:cNvPr id="1046" name="Group 1045">
+            <a:extLst>
+              <a:ext uri="{FF2B5EF4-FFF2-40B4-BE49-F238E27FC236}">
+                <a16:creationId xmlns:a16="http://schemas.microsoft.com/office/drawing/2014/main" id="{FDB9778A-773A-48CF-8976-0509A5766FCF}"/>
+              </a:ext>
+            </a:extLst>
+          </p:cNvPr>
+          <p:cNvGrpSpPr/>
+          <p:nvPr/>
+        </p:nvGrpSpPr>
+        <p:grpSpPr>
+          <a:xfrm>
+            <a:off x="4260938" y="2471182"/>
+            <a:ext cx="789000" cy="835400"/>
+            <a:chOff x="4052939" y="2481606"/>
+            <a:chExt cx="789000" cy="835400"/>
+          </a:xfrm>
+        </p:grpSpPr>
+        <p:pic>
+          <p:nvPicPr>
+            <p:cNvPr id="20" name="Picture 19" descr="A close up of a sign&#10;&#10;Description automatically generated">
+              <a:extLst>
+                <a:ext uri="{FF2B5EF4-FFF2-40B4-BE49-F238E27FC236}">
+                  <a16:creationId xmlns:a16="http://schemas.microsoft.com/office/drawing/2014/main" id="{15A3BFB3-9CA8-43A8-9454-A0F42450CE6C}"/>
+                </a:ext>
+              </a:extLst>
+            </p:cNvPr>
+            <p:cNvPicPr>
+              <a:picLocks noChangeAspect="1"/>
+            </p:cNvPicPr>
+            <p:nvPr/>
+          </p:nvPicPr>
+          <p:blipFill>
+            <a:blip r:embed="rId2">
+              <a:extLst>
+                <a:ext uri="{28A0092B-C50C-407E-A947-70E740481C1C}">
+                  <a14:useLocalDpi xmlns:a14="http://schemas.microsoft.com/office/drawing/2010/main" val="0"/>
+                </a:ext>
+              </a:extLst>
+            </a:blip>
+            <a:stretch>
+              <a:fillRect/>
+            </a:stretch>
+          </p:blipFill>
+          <p:spPr>
+            <a:xfrm>
+              <a:off x="4195158" y="2481606"/>
+              <a:ext cx="504562" cy="548640"/>
+            </a:xfrm>
+            <a:prstGeom prst="rect">
+              <a:avLst/>
+            </a:prstGeom>
+          </p:spPr>
+        </p:pic>
+        <p:sp>
+          <p:nvSpPr>
+            <p:cNvPr id="21" name="TextBox 20">
+              <a:extLst>
+                <a:ext uri="{FF2B5EF4-FFF2-40B4-BE49-F238E27FC236}">
+                  <a16:creationId xmlns:a16="http://schemas.microsoft.com/office/drawing/2014/main" id="{EE1BF865-7AB7-4FA0-8DE1-63716C2E3103}"/>
+                </a:ext>
+              </a:extLst>
+            </p:cNvPr>
+            <p:cNvSpPr txBox="1"/>
+            <p:nvPr/>
+          </p:nvSpPr>
+          <p:spPr>
+            <a:xfrm>
+              <a:off x="4052939" y="3040007"/>
+              <a:ext cx="789000" cy="276999"/>
+            </a:xfrm>
+            <a:prstGeom prst="rect">
+              <a:avLst/>
+            </a:prstGeom>
+            <a:noFill/>
+          </p:spPr>
+          <p:txBody>
+            <a:bodyPr wrap="none" rtlCol="0">
+              <a:spAutoFit/>
+            </a:bodyPr>
+            <a:lstStyle/>
+            <a:p>
+              <a:r>
+                <a:rPr lang="en-US" sz="1200" dirty="0">
+                  <a:latin typeface="Arial" panose="020B0604020202020204" pitchFamily="34" charset="0"/>
+                  <a:cs typeface="Arial" panose="020B0604020202020204" pitchFamily="34" charset="0"/>
+                </a:rPr>
+                <a:t>Feedback</a:t>
+              </a:r>
+            </a:p>
+          </p:txBody>
+        </p:sp>
+      </p:grpSp>
+      <p:grpSp>
+        <p:nvGrpSpPr>
+          <p:cNvPr id="44" name="Group 43">
+            <a:extLst>
+              <a:ext uri="{FF2B5EF4-FFF2-40B4-BE49-F238E27FC236}">
+                <a16:creationId xmlns:a16="http://schemas.microsoft.com/office/drawing/2014/main" id="{45CFD29B-15CC-4006-AC2E-5D34B6FBEDB2}"/>
+              </a:ext>
+            </a:extLst>
+          </p:cNvPr>
+          <p:cNvGrpSpPr/>
+          <p:nvPr/>
+        </p:nvGrpSpPr>
+        <p:grpSpPr>
+          <a:xfrm>
+            <a:off x="2658403" y="2449649"/>
+            <a:ext cx="952283" cy="868361"/>
+            <a:chOff x="5989395" y="1319933"/>
+            <a:chExt cx="952283" cy="868361"/>
+          </a:xfrm>
+        </p:grpSpPr>
+        <p:sp>
+          <p:nvSpPr>
+            <p:cNvPr id="10" name="TextBox 9">
+              <a:extLst>
+                <a:ext uri="{FF2B5EF4-FFF2-40B4-BE49-F238E27FC236}">
+                  <a16:creationId xmlns:a16="http://schemas.microsoft.com/office/drawing/2014/main" id="{05BAE8A0-4CDE-446D-96A9-69B12C0A6794}"/>
+                </a:ext>
+              </a:extLst>
+            </p:cNvPr>
+            <p:cNvSpPr txBox="1"/>
+            <p:nvPr/>
+          </p:nvSpPr>
+          <p:spPr>
+            <a:xfrm>
+              <a:off x="5989395" y="1911295"/>
+              <a:ext cx="952283" cy="276999"/>
+            </a:xfrm>
+            <a:prstGeom prst="rect">
+              <a:avLst/>
+            </a:prstGeom>
+            <a:noFill/>
+          </p:spPr>
+          <p:txBody>
+            <a:bodyPr wrap="square" rtlCol="0">
+              <a:spAutoFit/>
+            </a:bodyPr>
+            <a:lstStyle/>
+            <a:p>
+              <a:pPr algn="ctr"/>
+              <a:r>
+                <a:rPr lang="en-US" sz="1200" dirty="0">
+                  <a:latin typeface="Arial" panose="020B0604020202020204" pitchFamily="34" charset="0"/>
+                  <a:cs typeface="Arial" panose="020B0604020202020204" pitchFamily="34" charset="0"/>
+                </a:rPr>
+                <a:t>Report</a:t>
+              </a:r>
+            </a:p>
+          </p:txBody>
+        </p:sp>
+        <p:pic>
+          <p:nvPicPr>
+            <p:cNvPr id="13" name="Picture 12" descr="A screen shot of a computer&#10;&#10;Description automatically generated">
+              <a:extLst>
+                <a:ext uri="{FF2B5EF4-FFF2-40B4-BE49-F238E27FC236}">
+                  <a16:creationId xmlns:a16="http://schemas.microsoft.com/office/drawing/2014/main" id="{76FCE0F3-70EB-4737-A01C-0B6995E0308B}"/>
+                </a:ext>
+              </a:extLst>
+            </p:cNvPr>
+            <p:cNvPicPr>
+              <a:picLocks noChangeAspect="1"/>
+            </p:cNvPicPr>
+            <p:nvPr/>
+          </p:nvPicPr>
+          <p:blipFill>
+            <a:blip r:embed="rId3">
+              <a:extLst>
+                <a:ext uri="{28A0092B-C50C-407E-A947-70E740481C1C}">
+                  <a14:useLocalDpi xmlns:a14="http://schemas.microsoft.com/office/drawing/2010/main" val="0"/>
+                </a:ext>
+              </a:extLst>
+            </a:blip>
+            <a:stretch>
+              <a:fillRect/>
+            </a:stretch>
+          </p:blipFill>
+          <p:spPr>
+            <a:xfrm>
+              <a:off x="6160695" y="1319933"/>
+              <a:ext cx="609685" cy="609685"/>
+            </a:xfrm>
+            <a:prstGeom prst="rect">
+              <a:avLst/>
+            </a:prstGeom>
+          </p:spPr>
+        </p:pic>
+      </p:grpSp>
+      <p:grpSp>
+        <p:nvGrpSpPr>
+          <p:cNvPr id="31" name="Group 30">
+            <a:extLst>
+              <a:ext uri="{FF2B5EF4-FFF2-40B4-BE49-F238E27FC236}">
+                <a16:creationId xmlns:a16="http://schemas.microsoft.com/office/drawing/2014/main" id="{9885D116-6E9F-47FB-B456-E3F962E198E6}"/>
+              </a:ext>
+            </a:extLst>
+          </p:cNvPr>
+          <p:cNvGrpSpPr/>
+          <p:nvPr/>
+        </p:nvGrpSpPr>
+        <p:grpSpPr>
+          <a:xfrm>
+            <a:off x="9817" y="3143247"/>
+            <a:ext cx="712054" cy="807709"/>
+            <a:chOff x="5850713" y="2076470"/>
+            <a:chExt cx="712054" cy="807709"/>
+          </a:xfrm>
+        </p:grpSpPr>
+        <p:pic>
+          <p:nvPicPr>
+            <p:cNvPr id="7" name="Picture 6">
+              <a:extLst>
+                <a:ext uri="{FF2B5EF4-FFF2-40B4-BE49-F238E27FC236}">
+                  <a16:creationId xmlns:a16="http://schemas.microsoft.com/office/drawing/2014/main" id="{9DFD62F8-ACF0-41B5-8A91-D2C0A5B08A79}"/>
+                </a:ext>
+              </a:extLst>
+            </p:cNvPr>
+            <p:cNvPicPr>
+              <a:picLocks noChangeAspect="1"/>
+            </p:cNvPicPr>
+            <p:nvPr/>
+          </p:nvPicPr>
+          <p:blipFill>
+            <a:blip r:embed="rId4">
+              <a:extLst>
+                <a:ext uri="{28A0092B-C50C-407E-A947-70E740481C1C}">
+                  <a14:useLocalDpi xmlns:a14="http://schemas.microsoft.com/office/drawing/2010/main" val="0"/>
+                </a:ext>
+              </a:extLst>
+            </a:blip>
+            <a:stretch>
+              <a:fillRect/>
+            </a:stretch>
+          </p:blipFill>
+          <p:spPr>
+            <a:xfrm>
+              <a:off x="5905457" y="2076470"/>
+              <a:ext cx="609685" cy="609685"/>
+            </a:xfrm>
+            <a:prstGeom prst="rect">
+              <a:avLst/>
+            </a:prstGeom>
+          </p:spPr>
+        </p:pic>
+        <p:sp>
+          <p:nvSpPr>
+            <p:cNvPr id="16" name="TextBox 15">
+              <a:extLst>
+                <a:ext uri="{FF2B5EF4-FFF2-40B4-BE49-F238E27FC236}">
+                  <a16:creationId xmlns:a16="http://schemas.microsoft.com/office/drawing/2014/main" id="{70ECCA02-3B87-46DE-8DE0-345E204A0DCF}"/>
+                </a:ext>
+              </a:extLst>
+            </p:cNvPr>
+            <p:cNvSpPr txBox="1"/>
+            <p:nvPr/>
+          </p:nvSpPr>
+          <p:spPr>
+            <a:xfrm>
+              <a:off x="5850713" y="2607180"/>
+              <a:ext cx="712054" cy="276999"/>
+            </a:xfrm>
+            <a:prstGeom prst="rect">
+              <a:avLst/>
+            </a:prstGeom>
+            <a:noFill/>
+          </p:spPr>
+          <p:txBody>
+            <a:bodyPr wrap="none" rtlCol="0">
+              <a:spAutoFit/>
+            </a:bodyPr>
+            <a:lstStyle/>
+            <a:p>
+              <a:r>
+                <a:rPr lang="en-US" sz="1200" dirty="0">
+                  <a:latin typeface="Arial" panose="020B0604020202020204" pitchFamily="34" charset="0"/>
+                  <a:cs typeface="Arial" panose="020B0604020202020204" pitchFamily="34" charset="0"/>
+                </a:rPr>
+                <a:t>Learner</a:t>
+              </a:r>
+            </a:p>
+          </p:txBody>
+        </p:sp>
+      </p:grpSp>
+      <p:grpSp>
+        <p:nvGrpSpPr>
+          <p:cNvPr id="30" name="Group 29">
+            <a:extLst>
+              <a:ext uri="{FF2B5EF4-FFF2-40B4-BE49-F238E27FC236}">
+                <a16:creationId xmlns:a16="http://schemas.microsoft.com/office/drawing/2014/main" id="{C427EFF0-63C4-4EA3-B403-4BB9E73363E4}"/>
+              </a:ext>
+            </a:extLst>
+          </p:cNvPr>
+          <p:cNvGrpSpPr/>
+          <p:nvPr/>
+        </p:nvGrpSpPr>
+        <p:grpSpPr>
+          <a:xfrm>
+            <a:off x="-51776" y="933222"/>
+            <a:ext cx="730265" cy="821041"/>
+            <a:chOff x="5677243" y="548071"/>
+            <a:chExt cx="730265" cy="821041"/>
+          </a:xfrm>
+        </p:grpSpPr>
+        <p:pic>
+          <p:nvPicPr>
+            <p:cNvPr id="5" name="Picture 4">
+              <a:extLst>
+                <a:ext uri="{FF2B5EF4-FFF2-40B4-BE49-F238E27FC236}">
+                  <a16:creationId xmlns:a16="http://schemas.microsoft.com/office/drawing/2014/main" id="{007D0D33-24FC-42F6-BBA1-052B57EF9679}"/>
+                </a:ext>
+              </a:extLst>
+            </p:cNvPr>
+            <p:cNvPicPr>
+              <a:picLocks noChangeAspect="1"/>
+            </p:cNvPicPr>
+            <p:nvPr/>
+          </p:nvPicPr>
+          <p:blipFill>
+            <a:blip r:embed="rId5">
+              <a:extLst>
+                <a:ext uri="{28A0092B-C50C-407E-A947-70E740481C1C}">
+                  <a14:useLocalDpi xmlns:a14="http://schemas.microsoft.com/office/drawing/2010/main" val="0"/>
+                </a:ext>
+              </a:extLst>
+            </a:blip>
+            <a:stretch>
+              <a:fillRect/>
+            </a:stretch>
+          </p:blipFill>
+          <p:spPr>
+            <a:xfrm>
+              <a:off x="5779612" y="548071"/>
+              <a:ext cx="609685" cy="609685"/>
+            </a:xfrm>
+            <a:prstGeom prst="rect">
+              <a:avLst/>
+            </a:prstGeom>
+          </p:spPr>
+        </p:pic>
+        <p:sp>
+          <p:nvSpPr>
+            <p:cNvPr id="28" name="TextBox 27">
+              <a:extLst>
+                <a:ext uri="{FF2B5EF4-FFF2-40B4-BE49-F238E27FC236}">
+                  <a16:creationId xmlns:a16="http://schemas.microsoft.com/office/drawing/2014/main" id="{6094A916-EF53-45D6-8F7C-C9FFAFB9615E}"/>
+                </a:ext>
+              </a:extLst>
+            </p:cNvPr>
+            <p:cNvSpPr txBox="1"/>
+            <p:nvPr/>
+          </p:nvSpPr>
+          <p:spPr>
+            <a:xfrm>
+              <a:off x="5677243" y="1092113"/>
+              <a:ext cx="730265" cy="276999"/>
+            </a:xfrm>
+            <a:prstGeom prst="rect">
+              <a:avLst/>
+            </a:prstGeom>
+            <a:noFill/>
+          </p:spPr>
+          <p:txBody>
+            <a:bodyPr wrap="none" rtlCol="0">
+              <a:spAutoFit/>
+            </a:bodyPr>
+            <a:lstStyle/>
+            <a:p>
+              <a:pPr algn="ctr"/>
+              <a:r>
+                <a:rPr lang="en-US" sz="1200" dirty="0">
+                  <a:latin typeface="Arial" panose="020B0604020202020204" pitchFamily="34" charset="0"/>
+                  <a:cs typeface="Arial" panose="020B0604020202020204" pitchFamily="34" charset="0"/>
+                </a:rPr>
+                <a:t>Teacher</a:t>
+              </a:r>
+            </a:p>
+          </p:txBody>
+        </p:sp>
+      </p:grpSp>
+      <p:grpSp>
+        <p:nvGrpSpPr>
+          <p:cNvPr id="52" name="Group 51">
+            <a:extLst>
+              <a:ext uri="{FF2B5EF4-FFF2-40B4-BE49-F238E27FC236}">
+                <a16:creationId xmlns:a16="http://schemas.microsoft.com/office/drawing/2014/main" id="{C665B808-FEDB-4CC4-8E7B-9037193B2D39}"/>
+              </a:ext>
+            </a:extLst>
+          </p:cNvPr>
+          <p:cNvGrpSpPr/>
+          <p:nvPr/>
+        </p:nvGrpSpPr>
+        <p:grpSpPr>
+          <a:xfrm>
+            <a:off x="620013" y="955977"/>
+            <a:ext cx="652637" cy="295304"/>
+            <a:chOff x="1161961" y="995810"/>
+            <a:chExt cx="724782" cy="295304"/>
+          </a:xfrm>
+        </p:grpSpPr>
+        <p:sp>
+          <p:nvSpPr>
+            <p:cNvPr id="32" name="TextBox 31">
+              <a:extLst>
+                <a:ext uri="{FF2B5EF4-FFF2-40B4-BE49-F238E27FC236}">
+                  <a16:creationId xmlns:a16="http://schemas.microsoft.com/office/drawing/2014/main" id="{CF691B24-B6B6-4E8A-BA39-E595947EC9F8}"/>
+                </a:ext>
+              </a:extLst>
+            </p:cNvPr>
+            <p:cNvSpPr txBox="1"/>
+            <p:nvPr/>
+          </p:nvSpPr>
+          <p:spPr>
+            <a:xfrm>
+              <a:off x="1161961" y="995810"/>
+              <a:ext cx="721672" cy="276999"/>
+            </a:xfrm>
+            <a:prstGeom prst="rect">
+              <a:avLst/>
+            </a:prstGeom>
+            <a:noFill/>
+          </p:spPr>
+          <p:txBody>
+            <a:bodyPr wrap="none" rtlCol="0">
+              <a:spAutoFit/>
+            </a:bodyPr>
+            <a:lstStyle>
+              <a:defPPr>
+                <a:defRPr lang="en-US"/>
+              </a:defPPr>
+              <a:lvl1pPr>
+                <a:defRPr sz="1200">
+                  <a:latin typeface="Arial" panose="020B0604020202020204" pitchFamily="34" charset="0"/>
+                  <a:cs typeface="Arial" panose="020B0604020202020204" pitchFamily="34" charset="0"/>
+                </a:defRPr>
+              </a:lvl1pPr>
+            </a:lstStyle>
+            <a:p>
+              <a:r>
+                <a:rPr lang="en-US" i="1" dirty="0"/>
+                <a:t>Creates</a:t>
+              </a:r>
+            </a:p>
+          </p:txBody>
+        </p:sp>
+        <p:cxnSp>
+          <p:nvCxnSpPr>
+            <p:cNvPr id="34" name="Straight Arrow Connector 33">
+              <a:extLst>
+                <a:ext uri="{FF2B5EF4-FFF2-40B4-BE49-F238E27FC236}">
+                  <a16:creationId xmlns:a16="http://schemas.microsoft.com/office/drawing/2014/main" id="{636A2A0F-8B27-4DC4-AEDA-4D30516C1304}"/>
+                </a:ext>
+              </a:extLst>
+            </p:cNvPr>
+            <p:cNvCxnSpPr/>
+            <p:nvPr/>
+          </p:nvCxnSpPr>
+          <p:spPr>
+            <a:xfrm>
+              <a:off x="1200943" y="1291114"/>
+              <a:ext cx="685800" cy="0"/>
+            </a:xfrm>
+            <a:prstGeom prst="straightConnector1">
+              <a:avLst/>
+            </a:prstGeom>
+            <a:ln w="38100">
+              <a:tailEnd type="triangle"/>
+            </a:ln>
+          </p:spPr>
+          <p:style>
+            <a:lnRef idx="3">
+              <a:schemeClr val="dk1"/>
+            </a:lnRef>
+            <a:fillRef idx="0">
+              <a:schemeClr val="dk1"/>
+            </a:fillRef>
+            <a:effectRef idx="2">
+              <a:schemeClr val="dk1"/>
+            </a:effectRef>
+            <a:fontRef idx="minor">
+              <a:schemeClr val="tx1"/>
+            </a:fontRef>
+          </p:style>
+        </p:cxnSp>
+      </p:grpSp>
+      <p:grpSp>
+        <p:nvGrpSpPr>
+          <p:cNvPr id="37" name="Group 36">
+            <a:extLst>
+              <a:ext uri="{FF2B5EF4-FFF2-40B4-BE49-F238E27FC236}">
+                <a16:creationId xmlns:a16="http://schemas.microsoft.com/office/drawing/2014/main" id="{A1A66B36-3D2B-4D2B-B2E3-D1D039A56430}"/>
+              </a:ext>
+            </a:extLst>
+          </p:cNvPr>
+          <p:cNvGrpSpPr/>
+          <p:nvPr/>
+        </p:nvGrpSpPr>
+        <p:grpSpPr>
+          <a:xfrm>
+            <a:off x="1280573" y="933222"/>
+            <a:ext cx="840882" cy="1179764"/>
+            <a:chOff x="2379478" y="582986"/>
+            <a:chExt cx="840882" cy="1179764"/>
+          </a:xfrm>
+        </p:grpSpPr>
+        <p:pic>
+          <p:nvPicPr>
+            <p:cNvPr id="15" name="Picture 14" descr="A close up of a sign&#10;&#10;Description automatically generated">
+              <a:extLst>
+                <a:ext uri="{FF2B5EF4-FFF2-40B4-BE49-F238E27FC236}">
+                  <a16:creationId xmlns:a16="http://schemas.microsoft.com/office/drawing/2014/main" id="{3C71EA82-4235-4E63-8F3E-249AF00E91EB}"/>
+                </a:ext>
+              </a:extLst>
+            </p:cNvPr>
+            <p:cNvPicPr>
+              <a:picLocks noChangeAspect="1"/>
+            </p:cNvPicPr>
+            <p:nvPr/>
+          </p:nvPicPr>
+          <p:blipFill>
+            <a:blip r:embed="rId6">
+              <a:extLst>
+                <a:ext uri="{28A0092B-C50C-407E-A947-70E740481C1C}">
+                  <a14:useLocalDpi xmlns:a14="http://schemas.microsoft.com/office/drawing/2010/main" val="0"/>
+                </a:ext>
+              </a:extLst>
+            </a:blip>
+            <a:stretch>
+              <a:fillRect/>
+            </a:stretch>
+          </p:blipFill>
+          <p:spPr>
+            <a:xfrm>
+              <a:off x="2495077" y="582986"/>
+              <a:ext cx="609685" cy="609685"/>
+            </a:xfrm>
+            <a:prstGeom prst="rect">
+              <a:avLst/>
+            </a:prstGeom>
+          </p:spPr>
+        </p:pic>
+        <p:sp>
+          <p:nvSpPr>
+            <p:cNvPr id="36" name="TextBox 35">
+              <a:extLst>
+                <a:ext uri="{FF2B5EF4-FFF2-40B4-BE49-F238E27FC236}">
+                  <a16:creationId xmlns:a16="http://schemas.microsoft.com/office/drawing/2014/main" id="{C83A6143-8DEF-4D14-BD94-32068BF2B254}"/>
+                </a:ext>
+              </a:extLst>
+            </p:cNvPr>
+            <p:cNvSpPr txBox="1"/>
+            <p:nvPr/>
+          </p:nvSpPr>
+          <p:spPr>
+            <a:xfrm>
+              <a:off x="2379478" y="1116419"/>
+              <a:ext cx="840882" cy="646331"/>
+            </a:xfrm>
+            <a:prstGeom prst="rect">
+              <a:avLst/>
+            </a:prstGeom>
+            <a:noFill/>
+          </p:spPr>
+          <p:txBody>
+            <a:bodyPr wrap="square" rtlCol="0">
+              <a:spAutoFit/>
+            </a:bodyPr>
+            <a:lstStyle>
+              <a:defPPr>
+                <a:defRPr lang="en-US"/>
+              </a:defPPr>
+              <a:lvl1pPr>
+                <a:defRPr sz="1200">
+                  <a:latin typeface="Arial" panose="020B0604020202020204" pitchFamily="34" charset="0"/>
+                  <a:cs typeface="Arial" panose="020B0604020202020204" pitchFamily="34" charset="0"/>
+                </a:defRPr>
+              </a:lvl1pPr>
+            </a:lstStyle>
+            <a:p>
+              <a:pPr algn="ctr"/>
+              <a:r>
+                <a:rPr lang="en-US" dirty="0"/>
+                <a:t>Instructor Control Script</a:t>
+              </a:r>
+            </a:p>
+          </p:txBody>
+        </p:sp>
+      </p:grpSp>
+      <p:sp>
+        <p:nvSpPr>
+          <p:cNvPr id="38" name="TextBox 37">
+            <a:extLst>
+              <a:ext uri="{FF2B5EF4-FFF2-40B4-BE49-F238E27FC236}">
+                <a16:creationId xmlns:a16="http://schemas.microsoft.com/office/drawing/2014/main" id="{D2945EBF-E36B-455E-AC9E-3CCFC6434CE7}"/>
+              </a:ext>
+            </a:extLst>
+          </p:cNvPr>
+          <p:cNvSpPr txBox="1"/>
+          <p:nvPr/>
+        </p:nvSpPr>
+        <p:spPr>
+          <a:xfrm>
+            <a:off x="1878312" y="970744"/>
+            <a:ext cx="575799" cy="276999"/>
+          </a:xfrm>
+          <a:prstGeom prst="rect">
+            <a:avLst/>
+          </a:prstGeom>
+          <a:noFill/>
+        </p:spPr>
+        <p:txBody>
+          <a:bodyPr wrap="none" rtlCol="0">
+            <a:spAutoFit/>
+          </a:bodyPr>
+          <a:lstStyle>
+            <a:defPPr>
+              <a:defRPr lang="en-US"/>
+            </a:defPPr>
+            <a:lvl1pPr>
+              <a:defRPr sz="1200">
+                <a:latin typeface="Arial" panose="020B0604020202020204" pitchFamily="34" charset="0"/>
+                <a:cs typeface="Arial" panose="020B0604020202020204" pitchFamily="34" charset="0"/>
+              </a:defRPr>
+            </a:lvl1pPr>
+          </a:lstStyle>
+          <a:p>
+            <a:r>
+              <a:rPr lang="en-US" i="1" dirty="0"/>
+              <a:t>Using</a:t>
+            </a:r>
+          </a:p>
+        </p:txBody>
+      </p:sp>
+      <p:grpSp>
+        <p:nvGrpSpPr>
+          <p:cNvPr id="53" name="Group 52">
+            <a:extLst>
+              <a:ext uri="{FF2B5EF4-FFF2-40B4-BE49-F238E27FC236}">
+                <a16:creationId xmlns:a16="http://schemas.microsoft.com/office/drawing/2014/main" id="{E26C259E-7EDC-44C1-94B1-C26410F86564}"/>
+              </a:ext>
+            </a:extLst>
+          </p:cNvPr>
+          <p:cNvGrpSpPr/>
+          <p:nvPr/>
+        </p:nvGrpSpPr>
+        <p:grpSpPr>
+          <a:xfrm>
+            <a:off x="6580718" y="1400880"/>
+            <a:ext cx="725284" cy="996740"/>
+            <a:chOff x="4452952" y="691056"/>
+            <a:chExt cx="725284" cy="996740"/>
+          </a:xfrm>
+        </p:grpSpPr>
+        <p:pic>
+          <p:nvPicPr>
+            <p:cNvPr id="41" name="Picture 40">
+              <a:extLst>
+                <a:ext uri="{FF2B5EF4-FFF2-40B4-BE49-F238E27FC236}">
+                  <a16:creationId xmlns:a16="http://schemas.microsoft.com/office/drawing/2014/main" id="{3AB7E267-5F00-49A6-A70F-F16DF5FB21B2}"/>
+                </a:ext>
+              </a:extLst>
+            </p:cNvPr>
+            <p:cNvPicPr>
+              <a:picLocks noChangeAspect="1"/>
+            </p:cNvPicPr>
+            <p:nvPr/>
+          </p:nvPicPr>
+          <p:blipFill>
+            <a:blip r:embed="rId7">
+              <a:extLst>
+                <a:ext uri="{28A0092B-C50C-407E-A947-70E740481C1C}">
+                  <a14:useLocalDpi xmlns:a14="http://schemas.microsoft.com/office/drawing/2010/main" val="0"/>
+                </a:ext>
+              </a:extLst>
+            </a:blip>
+            <a:stretch>
+              <a:fillRect/>
+            </a:stretch>
+          </p:blipFill>
+          <p:spPr>
+            <a:xfrm>
+              <a:off x="4520461" y="691056"/>
+              <a:ext cx="609685" cy="609685"/>
+            </a:xfrm>
+            <a:prstGeom prst="rect">
+              <a:avLst/>
+            </a:prstGeom>
+          </p:spPr>
+        </p:pic>
+        <p:sp>
+          <p:nvSpPr>
+            <p:cNvPr id="43" name="TextBox 42">
+              <a:extLst>
+                <a:ext uri="{FF2B5EF4-FFF2-40B4-BE49-F238E27FC236}">
+                  <a16:creationId xmlns:a16="http://schemas.microsoft.com/office/drawing/2014/main" id="{BC9FC9A9-A964-48C9-8EB0-323B0C5AF1A5}"/>
+                </a:ext>
+              </a:extLst>
+            </p:cNvPr>
+            <p:cNvSpPr txBox="1"/>
+            <p:nvPr/>
+          </p:nvSpPr>
+          <p:spPr>
+            <a:xfrm>
+              <a:off x="4452952" y="1226131"/>
+              <a:ext cx="725284" cy="461665"/>
+            </a:xfrm>
+            <a:prstGeom prst="rect">
+              <a:avLst/>
+            </a:prstGeom>
+            <a:noFill/>
+          </p:spPr>
+          <p:txBody>
+            <a:bodyPr wrap="square" rtlCol="0">
+              <a:spAutoFit/>
+            </a:bodyPr>
+            <a:lstStyle>
+              <a:defPPr>
+                <a:defRPr lang="en-US"/>
+              </a:defPPr>
+              <a:lvl1pPr>
+                <a:defRPr sz="1200">
+                  <a:latin typeface="Arial" panose="020B0604020202020204" pitchFamily="34" charset="0"/>
+                  <a:cs typeface="Arial" panose="020B0604020202020204" pitchFamily="34" charset="0"/>
+                </a:defRPr>
+              </a:lvl1pPr>
+            </a:lstStyle>
+            <a:p>
+              <a:pPr algn="ctr"/>
+              <a:r>
+                <a:rPr lang="en-US" dirty="0"/>
+                <a:t>Core API</a:t>
+              </a:r>
+            </a:p>
+          </p:txBody>
+        </p:sp>
+      </p:grpSp>
+      <p:grpSp>
+        <p:nvGrpSpPr>
+          <p:cNvPr id="133" name="Group 132">
+            <a:extLst>
+              <a:ext uri="{FF2B5EF4-FFF2-40B4-BE49-F238E27FC236}">
+                <a16:creationId xmlns:a16="http://schemas.microsoft.com/office/drawing/2014/main" id="{D99736E2-7161-41A9-B10B-A0532A0E4F41}"/>
+              </a:ext>
+            </a:extLst>
+          </p:cNvPr>
+          <p:cNvGrpSpPr/>
+          <p:nvPr/>
+        </p:nvGrpSpPr>
+        <p:grpSpPr>
+          <a:xfrm>
+            <a:off x="2658403" y="3670568"/>
+            <a:ext cx="952283" cy="844249"/>
+            <a:chOff x="2892030" y="2907219"/>
+            <a:chExt cx="952283" cy="844249"/>
+          </a:xfrm>
+        </p:grpSpPr>
+        <p:pic>
+          <p:nvPicPr>
+            <p:cNvPr id="46" name="Picture 45">
+              <a:extLst>
+                <a:ext uri="{FF2B5EF4-FFF2-40B4-BE49-F238E27FC236}">
+                  <a16:creationId xmlns:a16="http://schemas.microsoft.com/office/drawing/2014/main" id="{1232482F-20D5-4CFA-93AD-CCA455A01FAB}"/>
+                </a:ext>
+              </a:extLst>
+            </p:cNvPr>
+            <p:cNvPicPr>
+              <a:picLocks noChangeAspect="1"/>
+            </p:cNvPicPr>
+            <p:nvPr/>
+          </p:nvPicPr>
+          <p:blipFill>
+            <a:blip r:embed="rId8">
+              <a:extLst>
+                <a:ext uri="{28A0092B-C50C-407E-A947-70E740481C1C}">
+                  <a14:useLocalDpi xmlns:a14="http://schemas.microsoft.com/office/drawing/2010/main" val="0"/>
+                </a:ext>
+              </a:extLst>
+            </a:blip>
+            <a:stretch>
+              <a:fillRect/>
+            </a:stretch>
+          </p:blipFill>
+          <p:spPr>
+            <a:xfrm>
+              <a:off x="3060147" y="2907219"/>
+              <a:ext cx="609685" cy="609685"/>
+            </a:xfrm>
+            <a:prstGeom prst="rect">
+              <a:avLst/>
+            </a:prstGeom>
+          </p:spPr>
+        </p:pic>
+        <p:sp>
+          <p:nvSpPr>
+            <p:cNvPr id="47" name="TextBox 46">
+              <a:extLst>
+                <a:ext uri="{FF2B5EF4-FFF2-40B4-BE49-F238E27FC236}">
+                  <a16:creationId xmlns:a16="http://schemas.microsoft.com/office/drawing/2014/main" id="{4DFED15D-EF63-4BF9-B121-D4AF6766E34E}"/>
+                </a:ext>
+              </a:extLst>
+            </p:cNvPr>
+            <p:cNvSpPr txBox="1"/>
+            <p:nvPr/>
+          </p:nvSpPr>
+          <p:spPr>
+            <a:xfrm>
+              <a:off x="2892030" y="3474469"/>
+              <a:ext cx="952283" cy="276999"/>
+            </a:xfrm>
+            <a:prstGeom prst="rect">
+              <a:avLst/>
+            </a:prstGeom>
+            <a:noFill/>
+          </p:spPr>
+          <p:txBody>
+            <a:bodyPr wrap="square" rtlCol="0">
+              <a:spAutoFit/>
+            </a:bodyPr>
+            <a:lstStyle/>
+            <a:p>
+              <a:pPr algn="ctr"/>
+              <a:r>
+                <a:rPr lang="en-US" sz="1200" dirty="0">
+                  <a:latin typeface="Arial" panose="020B0604020202020204" pitchFamily="34" charset="0"/>
+                  <a:cs typeface="Arial" panose="020B0604020202020204" pitchFamily="34" charset="0"/>
+                </a:rPr>
+                <a:t>Resolver</a:t>
+              </a:r>
+            </a:p>
+          </p:txBody>
+        </p:sp>
+      </p:grpSp>
+      <p:cxnSp>
+        <p:nvCxnSpPr>
+          <p:cNvPr id="56" name="Straight Arrow Connector 55">
+            <a:extLst>
+              <a:ext uri="{FF2B5EF4-FFF2-40B4-BE49-F238E27FC236}">
+                <a16:creationId xmlns:a16="http://schemas.microsoft.com/office/drawing/2014/main" id="{57547B0C-781D-44A0-A6D6-0CE79C7ABF8B}"/>
+              </a:ext>
+            </a:extLst>
+          </p:cNvPr>
+          <p:cNvCxnSpPr>
+            <a:cxnSpLocks/>
+            <a:stCxn id="15" idx="3"/>
+          </p:cNvCxnSpPr>
+          <p:nvPr/>
+        </p:nvCxnSpPr>
+        <p:spPr>
+          <a:xfrm>
+            <a:off x="2005857" y="1238065"/>
+            <a:ext cx="726516" cy="0"/>
+          </a:xfrm>
+          <a:prstGeom prst="straightConnector1">
+            <a:avLst/>
+          </a:prstGeom>
+          <a:ln w="38100">
+            <a:tailEnd type="triangle"/>
+          </a:ln>
+        </p:spPr>
+        <p:style>
+          <a:lnRef idx="3">
+            <a:schemeClr val="dk1"/>
+          </a:lnRef>
+          <a:fillRef idx="0">
+            <a:schemeClr val="dk1"/>
+          </a:fillRef>
+          <a:effectRef idx="2">
+            <a:schemeClr val="dk1"/>
+          </a:effectRef>
+          <a:fontRef idx="minor">
+            <a:schemeClr val="tx1"/>
+          </a:fontRef>
+        </p:style>
+      </p:cxnSp>
+      <p:sp>
+        <p:nvSpPr>
+          <p:cNvPr id="59" name="TextBox 58">
+            <a:extLst>
+              <a:ext uri="{FF2B5EF4-FFF2-40B4-BE49-F238E27FC236}">
+                <a16:creationId xmlns:a16="http://schemas.microsoft.com/office/drawing/2014/main" id="{CEDF02D1-1A4E-4468-A6F6-A1A50EB9A48C}"/>
+              </a:ext>
+            </a:extLst>
+          </p:cNvPr>
+          <p:cNvSpPr txBox="1"/>
+          <p:nvPr/>
+        </p:nvSpPr>
+        <p:spPr>
+          <a:xfrm>
+            <a:off x="6864215" y="4408374"/>
+            <a:ext cx="883575" cy="276999"/>
+          </a:xfrm>
+          <a:prstGeom prst="rect">
+            <a:avLst/>
+          </a:prstGeom>
+          <a:noFill/>
+        </p:spPr>
+        <p:txBody>
+          <a:bodyPr wrap="none" rtlCol="0">
+            <a:spAutoFit/>
+          </a:bodyPr>
+          <a:lstStyle>
+            <a:defPPr>
+              <a:defRPr lang="en-US"/>
+            </a:defPPr>
+            <a:lvl1pPr>
+              <a:defRPr sz="1200">
+                <a:latin typeface="Arial" panose="020B0604020202020204" pitchFamily="34" charset="0"/>
+                <a:cs typeface="Arial" panose="020B0604020202020204" pitchFamily="34" charset="0"/>
+              </a:defRPr>
+            </a:lvl1pPr>
+          </a:lstStyle>
+          <a:p>
+            <a:r>
+              <a:rPr lang="en-US" i="1" dirty="0"/>
+              <a:t>Organizes</a:t>
+            </a:r>
+          </a:p>
+        </p:txBody>
+      </p:sp>
+      <p:sp>
+        <p:nvSpPr>
+          <p:cNvPr id="60" name="TextBox 59">
+            <a:extLst>
+              <a:ext uri="{FF2B5EF4-FFF2-40B4-BE49-F238E27FC236}">
+                <a16:creationId xmlns:a16="http://schemas.microsoft.com/office/drawing/2014/main" id="{6908CA88-317E-4444-AA9A-6FE1F7CC4F4A}"/>
+              </a:ext>
+            </a:extLst>
+          </p:cNvPr>
+          <p:cNvSpPr txBox="1"/>
+          <p:nvPr/>
+        </p:nvSpPr>
+        <p:spPr>
+          <a:xfrm>
+            <a:off x="7849015" y="3995171"/>
+            <a:ext cx="534121" cy="276999"/>
+          </a:xfrm>
+          <a:prstGeom prst="rect">
+            <a:avLst/>
+          </a:prstGeom>
+          <a:noFill/>
+        </p:spPr>
+        <p:txBody>
+          <a:bodyPr wrap="none" rtlCol="0">
+            <a:spAutoFit/>
+          </a:bodyPr>
+          <a:lstStyle>
+            <a:defPPr>
+              <a:defRPr lang="en-US"/>
+            </a:defPPr>
+            <a:lvl1pPr>
+              <a:defRPr sz="1200">
+                <a:latin typeface="Arial" panose="020B0604020202020204" pitchFamily="34" charset="0"/>
+                <a:cs typeface="Arial" panose="020B0604020202020204" pitchFamily="34" charset="0"/>
+              </a:defRPr>
+            </a:lvl1pPr>
+          </a:lstStyle>
+          <a:p>
+            <a:r>
+              <a:rPr lang="en-US" i="1" dirty="0"/>
+              <a:t>Uses</a:t>
+            </a:r>
+          </a:p>
+        </p:txBody>
+      </p:sp>
+      <p:grpSp>
+        <p:nvGrpSpPr>
+          <p:cNvPr id="130" name="Group 129">
+            <a:extLst>
+              <a:ext uri="{FF2B5EF4-FFF2-40B4-BE49-F238E27FC236}">
+                <a16:creationId xmlns:a16="http://schemas.microsoft.com/office/drawing/2014/main" id="{8BC18C37-0A08-4A4F-B402-26830B02FDBF}"/>
+              </a:ext>
+            </a:extLst>
+          </p:cNvPr>
+          <p:cNvGrpSpPr/>
+          <p:nvPr/>
+        </p:nvGrpSpPr>
+        <p:grpSpPr>
+          <a:xfrm>
+            <a:off x="7442788" y="2592521"/>
+            <a:ext cx="788999" cy="276999"/>
+            <a:chOff x="4834037" y="152129"/>
+            <a:chExt cx="788999" cy="276999"/>
+          </a:xfrm>
+        </p:grpSpPr>
+        <p:cxnSp>
+          <p:nvCxnSpPr>
+            <p:cNvPr id="62" name="Straight Arrow Connector 61">
+              <a:extLst>
+                <a:ext uri="{FF2B5EF4-FFF2-40B4-BE49-F238E27FC236}">
+                  <a16:creationId xmlns:a16="http://schemas.microsoft.com/office/drawing/2014/main" id="{6654FEDC-348D-4656-BE11-EF5E2E22FB50}"/>
+                </a:ext>
+              </a:extLst>
+            </p:cNvPr>
+            <p:cNvCxnSpPr>
+              <a:cxnSpLocks/>
+            </p:cNvCxnSpPr>
+            <p:nvPr/>
+          </p:nvCxnSpPr>
+          <p:spPr>
+            <a:xfrm>
+              <a:off x="4864836" y="419586"/>
+              <a:ext cx="685800" cy="0"/>
+            </a:xfrm>
+            <a:prstGeom prst="straightConnector1">
+              <a:avLst/>
+            </a:prstGeom>
+            <a:ln w="38100">
+              <a:tailEnd type="triangle"/>
+            </a:ln>
+          </p:spPr>
+          <p:style>
+            <a:lnRef idx="3">
+              <a:schemeClr val="dk1"/>
+            </a:lnRef>
+            <a:fillRef idx="0">
+              <a:schemeClr val="dk1"/>
+            </a:fillRef>
+            <a:effectRef idx="2">
+              <a:schemeClr val="dk1"/>
+            </a:effectRef>
+            <a:fontRef idx="minor">
+              <a:schemeClr val="tx1"/>
+            </a:fontRef>
+          </p:style>
+        </p:cxnSp>
+        <p:sp>
+          <p:nvSpPr>
+            <p:cNvPr id="63" name="TextBox 62">
+              <a:extLst>
+                <a:ext uri="{FF2B5EF4-FFF2-40B4-BE49-F238E27FC236}">
+                  <a16:creationId xmlns:a16="http://schemas.microsoft.com/office/drawing/2014/main" id="{DDBEF6DB-746F-4A6A-8884-8FEFAA34FDD3}"/>
+                </a:ext>
+              </a:extLst>
+            </p:cNvPr>
+            <p:cNvSpPr txBox="1"/>
+            <p:nvPr/>
+          </p:nvSpPr>
+          <p:spPr>
+            <a:xfrm>
+              <a:off x="4834037" y="152129"/>
+              <a:ext cx="788999" cy="276999"/>
+            </a:xfrm>
+            <a:prstGeom prst="rect">
+              <a:avLst/>
+            </a:prstGeom>
+            <a:noFill/>
+          </p:spPr>
+          <p:txBody>
+            <a:bodyPr wrap="square" rtlCol="0">
+              <a:spAutoFit/>
+            </a:bodyPr>
+            <a:lstStyle>
+              <a:defPPr>
+                <a:defRPr lang="en-US"/>
+              </a:defPPr>
+              <a:lvl1pPr>
+                <a:defRPr sz="1200">
+                  <a:latin typeface="Arial" panose="020B0604020202020204" pitchFamily="34" charset="0"/>
+                  <a:cs typeface="Arial" panose="020B0604020202020204" pitchFamily="34" charset="0"/>
+                </a:defRPr>
+              </a:lvl1pPr>
+            </a:lstStyle>
+            <a:p>
+              <a:r>
+                <a:rPr lang="en-US" i="1" dirty="0"/>
+                <a:t>Contains</a:t>
+              </a:r>
+            </a:p>
+          </p:txBody>
+        </p:sp>
+      </p:grpSp>
+      <p:grpSp>
+        <p:nvGrpSpPr>
+          <p:cNvPr id="64" name="Group 63">
+            <a:extLst>
+              <a:ext uri="{FF2B5EF4-FFF2-40B4-BE49-F238E27FC236}">
+                <a16:creationId xmlns:a16="http://schemas.microsoft.com/office/drawing/2014/main" id="{2C0419DA-961A-42E1-A720-AAE3BB09A860}"/>
+              </a:ext>
+            </a:extLst>
+          </p:cNvPr>
+          <p:cNvGrpSpPr/>
+          <p:nvPr/>
+        </p:nvGrpSpPr>
+        <p:grpSpPr>
+          <a:xfrm>
+            <a:off x="654237" y="3439425"/>
+            <a:ext cx="577145" cy="400034"/>
+            <a:chOff x="1165036" y="901137"/>
+            <a:chExt cx="723635" cy="400034"/>
+          </a:xfrm>
+        </p:grpSpPr>
+        <p:sp>
+          <p:nvSpPr>
+            <p:cNvPr id="65" name="TextBox 64">
+              <a:extLst>
+                <a:ext uri="{FF2B5EF4-FFF2-40B4-BE49-F238E27FC236}">
+                  <a16:creationId xmlns:a16="http://schemas.microsoft.com/office/drawing/2014/main" id="{8D436ECE-C3EE-4A04-B03F-EF1A7C6AB011}"/>
+                </a:ext>
+              </a:extLst>
+            </p:cNvPr>
+            <p:cNvSpPr txBox="1"/>
+            <p:nvPr/>
+          </p:nvSpPr>
+          <p:spPr>
+            <a:xfrm>
+              <a:off x="1165036" y="901137"/>
+              <a:ext cx="697627" cy="276999"/>
+            </a:xfrm>
+            <a:prstGeom prst="rect">
+              <a:avLst/>
+            </a:prstGeom>
+            <a:noFill/>
+          </p:spPr>
+          <p:txBody>
+            <a:bodyPr wrap="none" rtlCol="0">
+              <a:spAutoFit/>
+            </a:bodyPr>
+            <a:lstStyle>
+              <a:defPPr>
+                <a:defRPr lang="en-US"/>
+              </a:defPPr>
+              <a:lvl1pPr>
+                <a:defRPr sz="1200">
+                  <a:latin typeface="Arial" panose="020B0604020202020204" pitchFamily="34" charset="0"/>
+                  <a:cs typeface="Arial" panose="020B0604020202020204" pitchFamily="34" charset="0"/>
+                </a:defRPr>
+              </a:lvl1pPr>
+            </a:lstStyle>
+            <a:p>
+              <a:r>
+                <a:rPr lang="en-US" i="1" dirty="0"/>
+                <a:t>Informs</a:t>
+              </a:r>
+            </a:p>
+          </p:txBody>
+        </p:sp>
+        <p:cxnSp>
+          <p:nvCxnSpPr>
+            <p:cNvPr id="66" name="Straight Arrow Connector 65">
+              <a:extLst>
+                <a:ext uri="{FF2B5EF4-FFF2-40B4-BE49-F238E27FC236}">
+                  <a16:creationId xmlns:a16="http://schemas.microsoft.com/office/drawing/2014/main" id="{76C7603C-C59E-4A77-BE73-B8BA9901A524}"/>
+                </a:ext>
+              </a:extLst>
+            </p:cNvPr>
+            <p:cNvCxnSpPr>
+              <a:cxnSpLocks/>
+            </p:cNvCxnSpPr>
+            <p:nvPr/>
+          </p:nvCxnSpPr>
+          <p:spPr>
+            <a:xfrm flipH="1" flipV="1">
+              <a:off x="1173707" y="1144365"/>
+              <a:ext cx="714964" cy="156806"/>
+            </a:xfrm>
+            <a:prstGeom prst="straightConnector1">
+              <a:avLst/>
+            </a:prstGeom>
+            <a:ln w="38100">
+              <a:tailEnd type="triangle"/>
+            </a:ln>
+          </p:spPr>
+          <p:style>
+            <a:lnRef idx="3">
+              <a:schemeClr val="dk1"/>
+            </a:lnRef>
+            <a:fillRef idx="0">
+              <a:schemeClr val="dk1"/>
+            </a:fillRef>
+            <a:effectRef idx="2">
+              <a:schemeClr val="dk1"/>
+            </a:effectRef>
+            <a:fontRef idx="minor">
+              <a:schemeClr val="tx1"/>
+            </a:fontRef>
+          </p:style>
+        </p:cxnSp>
+      </p:grpSp>
+      <p:sp>
+        <p:nvSpPr>
+          <p:cNvPr id="67" name="TextBox 66">
+            <a:extLst>
+              <a:ext uri="{FF2B5EF4-FFF2-40B4-BE49-F238E27FC236}">
+                <a16:creationId xmlns:a16="http://schemas.microsoft.com/office/drawing/2014/main" id="{95CCBAF4-0486-4905-AED3-A3A9F740F4D6}"/>
+              </a:ext>
+            </a:extLst>
+          </p:cNvPr>
+          <p:cNvSpPr txBox="1"/>
+          <p:nvPr/>
+        </p:nvSpPr>
+        <p:spPr>
+          <a:xfrm>
+            <a:off x="4646959" y="3374276"/>
+            <a:ext cx="958917" cy="276999"/>
+          </a:xfrm>
+          <a:prstGeom prst="rect">
+            <a:avLst/>
+          </a:prstGeom>
+          <a:noFill/>
+        </p:spPr>
+        <p:txBody>
+          <a:bodyPr wrap="none" rtlCol="0">
+            <a:spAutoFit/>
+          </a:bodyPr>
+          <a:lstStyle>
+            <a:defPPr>
+              <a:defRPr lang="en-US"/>
+            </a:defPPr>
+            <a:lvl1pPr>
+              <a:defRPr sz="1200">
+                <a:latin typeface="Arial" panose="020B0604020202020204" pitchFamily="34" charset="0"/>
+                <a:cs typeface="Arial" panose="020B0604020202020204" pitchFamily="34" charset="0"/>
+              </a:defRPr>
+            </a:lvl1pPr>
+          </a:lstStyle>
+          <a:p>
+            <a:r>
+              <a:rPr lang="en-US" i="1" dirty="0"/>
+              <a:t>Composing</a:t>
+            </a:r>
+          </a:p>
+        </p:txBody>
+      </p:sp>
+      <p:cxnSp>
+        <p:nvCxnSpPr>
+          <p:cNvPr id="68" name="Straight Arrow Connector 67">
+            <a:extLst>
+              <a:ext uri="{FF2B5EF4-FFF2-40B4-BE49-F238E27FC236}">
+                <a16:creationId xmlns:a16="http://schemas.microsoft.com/office/drawing/2014/main" id="{58900FCE-0C87-4974-9AB2-C61106D83E22}"/>
+              </a:ext>
+            </a:extLst>
+          </p:cNvPr>
+          <p:cNvCxnSpPr>
+            <a:cxnSpLocks/>
+          </p:cNvCxnSpPr>
+          <p:nvPr/>
+        </p:nvCxnSpPr>
+        <p:spPr>
+          <a:xfrm>
+            <a:off x="4672401" y="3308928"/>
+            <a:ext cx="0" cy="320040"/>
+          </a:xfrm>
+          <a:prstGeom prst="straightConnector1">
+            <a:avLst/>
+          </a:prstGeom>
+          <a:ln w="38100">
+            <a:tailEnd type="triangle"/>
+          </a:ln>
+        </p:spPr>
+        <p:style>
+          <a:lnRef idx="3">
+            <a:schemeClr val="dk1"/>
+          </a:lnRef>
+          <a:fillRef idx="0">
+            <a:schemeClr val="dk1"/>
+          </a:fillRef>
+          <a:effectRef idx="2">
+            <a:schemeClr val="dk1"/>
+          </a:effectRef>
+          <a:fontRef idx="minor">
+            <a:schemeClr val="tx1"/>
+          </a:fontRef>
+        </p:style>
+      </p:cxnSp>
+      <p:grpSp>
+        <p:nvGrpSpPr>
+          <p:cNvPr id="1053" name="Group 1052">
+            <a:extLst>
+              <a:ext uri="{FF2B5EF4-FFF2-40B4-BE49-F238E27FC236}">
+                <a16:creationId xmlns:a16="http://schemas.microsoft.com/office/drawing/2014/main" id="{21D1111F-3DE7-4479-A614-19B52F559C9D}"/>
+              </a:ext>
+            </a:extLst>
+          </p:cNvPr>
+          <p:cNvGrpSpPr/>
+          <p:nvPr/>
+        </p:nvGrpSpPr>
+        <p:grpSpPr>
+          <a:xfrm>
+            <a:off x="1265443" y="3611431"/>
+            <a:ext cx="871143" cy="982065"/>
+            <a:chOff x="1318808" y="3611431"/>
+            <a:chExt cx="871143" cy="982065"/>
+          </a:xfrm>
+        </p:grpSpPr>
+        <p:sp>
+          <p:nvSpPr>
+            <p:cNvPr id="49" name="TextBox 48">
+              <a:extLst>
+                <a:ext uri="{FF2B5EF4-FFF2-40B4-BE49-F238E27FC236}">
+                  <a16:creationId xmlns:a16="http://schemas.microsoft.com/office/drawing/2014/main" id="{0C86110F-B7C1-423B-8D77-E3F076B4AD7F}"/>
+                </a:ext>
+              </a:extLst>
+            </p:cNvPr>
+            <p:cNvSpPr txBox="1"/>
+            <p:nvPr/>
+          </p:nvSpPr>
+          <p:spPr>
+            <a:xfrm>
+              <a:off x="1318808" y="4131831"/>
+              <a:ext cx="871143" cy="461665"/>
+            </a:xfrm>
+            <a:prstGeom prst="rect">
+              <a:avLst/>
+            </a:prstGeom>
+            <a:noFill/>
+          </p:spPr>
+          <p:txBody>
+            <a:bodyPr wrap="square" rtlCol="0">
+              <a:spAutoFit/>
+            </a:bodyPr>
+            <a:lstStyle>
+              <a:defPPr>
+                <a:defRPr lang="en-US"/>
+              </a:defPPr>
+              <a:lvl1pPr>
+                <a:defRPr sz="1200">
+                  <a:latin typeface="Arial" panose="020B0604020202020204" pitchFamily="34" charset="0"/>
+                  <a:cs typeface="Arial" panose="020B0604020202020204" pitchFamily="34" charset="0"/>
+                </a:defRPr>
+              </a:lvl1pPr>
+            </a:lstStyle>
+            <a:p>
+              <a:pPr algn="ctr"/>
+              <a:r>
+                <a:rPr lang="en-US" dirty="0"/>
+                <a:t>Final Feedback</a:t>
+              </a:r>
+            </a:p>
+          </p:txBody>
+        </p:sp>
+        <p:pic>
+          <p:nvPicPr>
+            <p:cNvPr id="71" name="Picture 70" descr="A close up of a screen&#10;&#10;Description automatically generated">
+              <a:extLst>
+                <a:ext uri="{FF2B5EF4-FFF2-40B4-BE49-F238E27FC236}">
+                  <a16:creationId xmlns:a16="http://schemas.microsoft.com/office/drawing/2014/main" id="{BE7AD296-F1CC-4AF9-BB38-BE434F63DAAB}"/>
+                </a:ext>
+              </a:extLst>
+            </p:cNvPr>
+            <p:cNvPicPr>
+              <a:picLocks noChangeAspect="1"/>
+            </p:cNvPicPr>
+            <p:nvPr/>
+          </p:nvPicPr>
+          <p:blipFill>
+            <a:blip r:embed="rId9">
+              <a:extLst>
+                <a:ext uri="{28A0092B-C50C-407E-A947-70E740481C1C}">
+                  <a14:useLocalDpi xmlns:a14="http://schemas.microsoft.com/office/drawing/2010/main" val="0"/>
+                </a:ext>
+              </a:extLst>
+            </a:blip>
+            <a:stretch>
+              <a:fillRect/>
+            </a:stretch>
+          </p:blipFill>
+          <p:spPr>
+            <a:xfrm>
+              <a:off x="1449537" y="3611431"/>
+              <a:ext cx="609685" cy="609685"/>
+            </a:xfrm>
+            <a:prstGeom prst="rect">
+              <a:avLst/>
+            </a:prstGeom>
+          </p:spPr>
+        </p:pic>
+      </p:grpSp>
+      <p:cxnSp>
+        <p:nvCxnSpPr>
+          <p:cNvPr id="72" name="Straight Arrow Connector 71">
+            <a:extLst>
+              <a:ext uri="{FF2B5EF4-FFF2-40B4-BE49-F238E27FC236}">
+                <a16:creationId xmlns:a16="http://schemas.microsoft.com/office/drawing/2014/main" id="{239E9F0A-4EC1-4285-9773-A1D99C07E2AE}"/>
+              </a:ext>
+            </a:extLst>
+          </p:cNvPr>
+          <p:cNvCxnSpPr>
+            <a:cxnSpLocks/>
+          </p:cNvCxnSpPr>
+          <p:nvPr/>
+        </p:nvCxnSpPr>
+        <p:spPr>
+          <a:xfrm flipH="1">
+            <a:off x="3117373" y="3332058"/>
+            <a:ext cx="0" cy="320040"/>
+          </a:xfrm>
+          <a:prstGeom prst="straightConnector1">
+            <a:avLst/>
+          </a:prstGeom>
+          <a:ln w="38100">
+            <a:tailEnd type="triangle"/>
+          </a:ln>
+        </p:spPr>
+        <p:style>
+          <a:lnRef idx="3">
+            <a:schemeClr val="dk1"/>
+          </a:lnRef>
+          <a:fillRef idx="0">
+            <a:schemeClr val="dk1"/>
+          </a:fillRef>
+          <a:effectRef idx="2">
+            <a:schemeClr val="dk1"/>
+          </a:effectRef>
+          <a:fontRef idx="minor">
+            <a:schemeClr val="tx1"/>
+          </a:fontRef>
+        </p:style>
+      </p:cxnSp>
+      <p:sp>
+        <p:nvSpPr>
+          <p:cNvPr id="74" name="TextBox 73">
+            <a:extLst>
+              <a:ext uri="{FF2B5EF4-FFF2-40B4-BE49-F238E27FC236}">
+                <a16:creationId xmlns:a16="http://schemas.microsoft.com/office/drawing/2014/main" id="{9B15F76A-7A57-470F-BB9B-D7CA5846A398}"/>
+              </a:ext>
+            </a:extLst>
+          </p:cNvPr>
+          <p:cNvSpPr txBox="1"/>
+          <p:nvPr/>
+        </p:nvSpPr>
+        <p:spPr>
+          <a:xfrm>
+            <a:off x="3097854" y="3349931"/>
+            <a:ext cx="788999" cy="276999"/>
+          </a:xfrm>
+          <a:prstGeom prst="rect">
+            <a:avLst/>
+          </a:prstGeom>
+          <a:noFill/>
+        </p:spPr>
+        <p:txBody>
+          <a:bodyPr wrap="none" rtlCol="0">
+            <a:spAutoFit/>
+          </a:bodyPr>
+          <a:lstStyle>
+            <a:defPPr>
+              <a:defRPr lang="en-US"/>
+            </a:defPPr>
+            <a:lvl1pPr>
+              <a:defRPr sz="1200">
+                <a:latin typeface="Arial" panose="020B0604020202020204" pitchFamily="34" charset="0"/>
+                <a:cs typeface="Arial" panose="020B0604020202020204" pitchFamily="34" charset="0"/>
+              </a:defRPr>
+            </a:lvl1pPr>
+          </a:lstStyle>
+          <a:p>
+            <a:r>
+              <a:rPr lang="en-US" i="1" dirty="0"/>
+              <a:t>Finalizes</a:t>
+            </a:r>
+          </a:p>
+        </p:txBody>
+      </p:sp>
+      <p:cxnSp>
+        <p:nvCxnSpPr>
+          <p:cNvPr id="79" name="Straight Arrow Connector 78">
+            <a:extLst>
+              <a:ext uri="{FF2B5EF4-FFF2-40B4-BE49-F238E27FC236}">
+                <a16:creationId xmlns:a16="http://schemas.microsoft.com/office/drawing/2014/main" id="{1236A67C-E453-4D56-8906-4852BE8429A5}"/>
+              </a:ext>
+            </a:extLst>
+          </p:cNvPr>
+          <p:cNvCxnSpPr>
+            <a:cxnSpLocks/>
+          </p:cNvCxnSpPr>
+          <p:nvPr/>
+        </p:nvCxnSpPr>
+        <p:spPr>
+          <a:xfrm flipV="1">
+            <a:off x="6858000" y="3480230"/>
+            <a:ext cx="0" cy="387454"/>
+          </a:xfrm>
+          <a:prstGeom prst="straightConnector1">
+            <a:avLst/>
+          </a:prstGeom>
+          <a:ln w="38100">
+            <a:headEnd type="triangle" w="med" len="med"/>
+            <a:tailEnd type="triangle" w="med" len="med"/>
+          </a:ln>
+        </p:spPr>
+        <p:style>
+          <a:lnRef idx="3">
+            <a:schemeClr val="dk1"/>
+          </a:lnRef>
+          <a:fillRef idx="0">
+            <a:schemeClr val="dk1"/>
+          </a:fillRef>
+          <a:effectRef idx="2">
+            <a:schemeClr val="dk1"/>
+          </a:effectRef>
+          <a:fontRef idx="minor">
+            <a:schemeClr val="tx1"/>
+          </a:fontRef>
+        </p:style>
+      </p:cxnSp>
+      <p:sp>
+        <p:nvSpPr>
+          <p:cNvPr id="82" name="TextBox 81">
+            <a:extLst>
+              <a:ext uri="{FF2B5EF4-FFF2-40B4-BE49-F238E27FC236}">
+                <a16:creationId xmlns:a16="http://schemas.microsoft.com/office/drawing/2014/main" id="{11B2EB58-2986-4CE7-B0B6-56813BA1A3DE}"/>
+              </a:ext>
+            </a:extLst>
+          </p:cNvPr>
+          <p:cNvSpPr txBox="1"/>
+          <p:nvPr/>
+        </p:nvSpPr>
+        <p:spPr>
+          <a:xfrm>
+            <a:off x="6981342" y="3369270"/>
+            <a:ext cx="1401794" cy="276999"/>
+          </a:xfrm>
+          <a:prstGeom prst="rect">
+            <a:avLst/>
+          </a:prstGeom>
+          <a:noFill/>
+        </p:spPr>
+        <p:txBody>
+          <a:bodyPr wrap="none" rtlCol="0">
+            <a:spAutoFit/>
+          </a:bodyPr>
+          <a:lstStyle>
+            <a:defPPr>
+              <a:defRPr lang="en-US"/>
+            </a:defPPr>
+            <a:lvl1pPr>
+              <a:defRPr sz="1200">
+                <a:latin typeface="Arial" panose="020B0604020202020204" pitchFamily="34" charset="0"/>
+                <a:cs typeface="Arial" panose="020B0604020202020204" pitchFamily="34" charset="0"/>
+              </a:defRPr>
+            </a:lvl1pPr>
+          </a:lstStyle>
+          <a:p>
+            <a:r>
+              <a:rPr lang="en-US" i="1" dirty="0"/>
+              <a:t>Reads and Writes</a:t>
+            </a:r>
+          </a:p>
+        </p:txBody>
+      </p:sp>
+      <p:cxnSp>
+        <p:nvCxnSpPr>
+          <p:cNvPr id="90" name="Straight Arrow Connector 89">
+            <a:extLst>
+              <a:ext uri="{FF2B5EF4-FFF2-40B4-BE49-F238E27FC236}">
+                <a16:creationId xmlns:a16="http://schemas.microsoft.com/office/drawing/2014/main" id="{578DEF67-F854-45FD-B330-31D5237CA699}"/>
+              </a:ext>
+            </a:extLst>
+          </p:cNvPr>
+          <p:cNvCxnSpPr>
+            <a:cxnSpLocks/>
+          </p:cNvCxnSpPr>
+          <p:nvPr/>
+        </p:nvCxnSpPr>
+        <p:spPr>
+          <a:xfrm>
+            <a:off x="8018538" y="1928487"/>
+            <a:ext cx="240266" cy="0"/>
+          </a:xfrm>
+          <a:prstGeom prst="straightConnector1">
+            <a:avLst/>
+          </a:prstGeom>
+          <a:ln w="12700">
+            <a:prstDash val="sysDash"/>
+            <a:tailEnd type="triangle"/>
+          </a:ln>
+        </p:spPr>
+        <p:style>
+          <a:lnRef idx="3">
+            <a:schemeClr val="dk1"/>
+          </a:lnRef>
+          <a:fillRef idx="0">
+            <a:schemeClr val="dk1"/>
+          </a:fillRef>
+          <a:effectRef idx="2">
+            <a:schemeClr val="dk1"/>
+          </a:effectRef>
+          <a:fontRef idx="minor">
+            <a:schemeClr val="tx1"/>
+          </a:fontRef>
+        </p:style>
+      </p:cxnSp>
+      <p:cxnSp>
+        <p:nvCxnSpPr>
+          <p:cNvPr id="101" name="Straight Arrow Connector 100">
+            <a:extLst>
+              <a:ext uri="{FF2B5EF4-FFF2-40B4-BE49-F238E27FC236}">
+                <a16:creationId xmlns:a16="http://schemas.microsoft.com/office/drawing/2014/main" id="{3A549FC6-B39F-4B9F-AE12-EF7682D28B32}"/>
+              </a:ext>
+            </a:extLst>
+          </p:cNvPr>
+          <p:cNvCxnSpPr>
+            <a:cxnSpLocks/>
+          </p:cNvCxnSpPr>
+          <p:nvPr/>
+        </p:nvCxnSpPr>
+        <p:spPr>
+          <a:xfrm>
+            <a:off x="7904283" y="2236193"/>
+            <a:ext cx="174756" cy="12951"/>
+          </a:xfrm>
+          <a:prstGeom prst="straightConnector1">
+            <a:avLst/>
+          </a:prstGeom>
+          <a:ln w="12700">
+            <a:prstDash val="sysDash"/>
+            <a:tailEnd type="triangle"/>
+          </a:ln>
+        </p:spPr>
+        <p:style>
+          <a:lnRef idx="3">
+            <a:schemeClr val="dk1"/>
+          </a:lnRef>
+          <a:fillRef idx="0">
+            <a:schemeClr val="dk1"/>
+          </a:fillRef>
+          <a:effectRef idx="2">
+            <a:schemeClr val="dk1"/>
+          </a:effectRef>
+          <a:fontRef idx="minor">
+            <a:schemeClr val="tx1"/>
+          </a:fontRef>
+        </p:style>
+      </p:cxnSp>
+      <p:cxnSp>
+        <p:nvCxnSpPr>
+          <p:cNvPr id="106" name="Straight Arrow Connector 105">
+            <a:extLst>
+              <a:ext uri="{FF2B5EF4-FFF2-40B4-BE49-F238E27FC236}">
+                <a16:creationId xmlns:a16="http://schemas.microsoft.com/office/drawing/2014/main" id="{F341323C-1471-4FCF-8685-B3503F7DAF45}"/>
+              </a:ext>
+            </a:extLst>
+          </p:cNvPr>
+          <p:cNvCxnSpPr>
+            <a:cxnSpLocks/>
+          </p:cNvCxnSpPr>
+          <p:nvPr/>
+        </p:nvCxnSpPr>
+        <p:spPr>
+          <a:xfrm flipH="1">
+            <a:off x="7887396" y="1661411"/>
+            <a:ext cx="7651" cy="142888"/>
+          </a:xfrm>
+          <a:prstGeom prst="straightConnector1">
+            <a:avLst/>
+          </a:prstGeom>
+          <a:ln w="12700">
+            <a:prstDash val="sysDash"/>
+            <a:tailEnd type="triangle"/>
+          </a:ln>
+        </p:spPr>
+        <p:style>
+          <a:lnRef idx="3">
+            <a:schemeClr val="dk1"/>
+          </a:lnRef>
+          <a:fillRef idx="0">
+            <a:schemeClr val="dk1"/>
+          </a:fillRef>
+          <a:effectRef idx="2">
+            <a:schemeClr val="dk1"/>
+          </a:effectRef>
+          <a:fontRef idx="minor">
+            <a:schemeClr val="tx1"/>
+          </a:fontRef>
+        </p:style>
+      </p:cxnSp>
+      <p:cxnSp>
+        <p:nvCxnSpPr>
+          <p:cNvPr id="118" name="Straight Arrow Connector 117">
+            <a:extLst>
+              <a:ext uri="{FF2B5EF4-FFF2-40B4-BE49-F238E27FC236}">
+                <a16:creationId xmlns:a16="http://schemas.microsoft.com/office/drawing/2014/main" id="{2948367A-AAC5-4957-B705-3388B91A74EB}"/>
+              </a:ext>
+            </a:extLst>
+          </p:cNvPr>
+          <p:cNvCxnSpPr>
+            <a:cxnSpLocks/>
+          </p:cNvCxnSpPr>
+          <p:nvPr/>
+        </p:nvCxnSpPr>
+        <p:spPr>
+          <a:xfrm flipH="1">
+            <a:off x="2032295" y="3937998"/>
+            <a:ext cx="678502" cy="0"/>
+          </a:xfrm>
+          <a:prstGeom prst="straightConnector1">
+            <a:avLst/>
+          </a:prstGeom>
+          <a:ln w="38100">
+            <a:tailEnd type="triangle"/>
+          </a:ln>
+        </p:spPr>
+        <p:style>
+          <a:lnRef idx="3">
+            <a:schemeClr val="dk1"/>
+          </a:lnRef>
+          <a:fillRef idx="0">
+            <a:schemeClr val="dk1"/>
+          </a:fillRef>
+          <a:effectRef idx="2">
+            <a:schemeClr val="dk1"/>
+          </a:effectRef>
+          <a:fontRef idx="minor">
+            <a:schemeClr val="tx1"/>
+          </a:fontRef>
+        </p:style>
+      </p:cxnSp>
+      <p:sp>
+        <p:nvSpPr>
+          <p:cNvPr id="124" name="TextBox 123">
+            <a:extLst>
+              <a:ext uri="{FF2B5EF4-FFF2-40B4-BE49-F238E27FC236}">
+                <a16:creationId xmlns:a16="http://schemas.microsoft.com/office/drawing/2014/main" id="{D2EC20AC-4138-4FD2-A3EF-8F8395C85E8E}"/>
+              </a:ext>
+            </a:extLst>
+          </p:cNvPr>
+          <p:cNvSpPr txBox="1"/>
+          <p:nvPr/>
+        </p:nvSpPr>
+        <p:spPr>
+          <a:xfrm>
+            <a:off x="2142675" y="3691500"/>
+            <a:ext cx="721672" cy="276999"/>
+          </a:xfrm>
+          <a:prstGeom prst="rect">
+            <a:avLst/>
+          </a:prstGeom>
+          <a:noFill/>
+        </p:spPr>
+        <p:txBody>
+          <a:bodyPr wrap="none" rtlCol="0">
+            <a:spAutoFit/>
+          </a:bodyPr>
+          <a:lstStyle>
+            <a:defPPr>
+              <a:defRPr lang="en-US"/>
+            </a:defPPr>
+            <a:lvl1pPr>
+              <a:defRPr sz="1200">
+                <a:latin typeface="Arial" panose="020B0604020202020204" pitchFamily="34" charset="0"/>
+                <a:cs typeface="Arial" panose="020B0604020202020204" pitchFamily="34" charset="0"/>
+              </a:defRPr>
+            </a:lvl1pPr>
+          </a:lstStyle>
+          <a:p>
+            <a:r>
+              <a:rPr lang="en-US" i="1" dirty="0"/>
+              <a:t>Returns</a:t>
+            </a:r>
+          </a:p>
+        </p:txBody>
+      </p:sp>
+      <p:sp>
+        <p:nvSpPr>
+          <p:cNvPr id="131" name="Freeform: Shape 130">
+            <a:extLst>
+              <a:ext uri="{FF2B5EF4-FFF2-40B4-BE49-F238E27FC236}">
+                <a16:creationId xmlns:a16="http://schemas.microsoft.com/office/drawing/2014/main" id="{C642EA96-88BB-4939-9AA1-9F360918730B}"/>
+              </a:ext>
+            </a:extLst>
+          </p:cNvPr>
+          <p:cNvSpPr/>
+          <p:nvPr/>
+        </p:nvSpPr>
+        <p:spPr>
+          <a:xfrm>
+            <a:off x="2142365" y="537660"/>
+            <a:ext cx="511373" cy="3941695"/>
+          </a:xfrm>
+          <a:custGeom>
+            <a:avLst/>
+            <a:gdLst>
+              <a:gd name="connsiteX0" fmla="*/ 286582 w 402078"/>
+              <a:gd name="connsiteY0" fmla="*/ 0 h 3021495"/>
+              <a:gd name="connsiteX1" fmla="*/ 167312 w 402078"/>
+              <a:gd name="connsiteY1" fmla="*/ 294198 h 3021495"/>
+              <a:gd name="connsiteX2" fmla="*/ 326339 w 402078"/>
+              <a:gd name="connsiteY2" fmla="*/ 771276 h 3021495"/>
+              <a:gd name="connsiteX3" fmla="*/ 335 w 402078"/>
+              <a:gd name="connsiteY3" fmla="*/ 1518699 h 3021495"/>
+              <a:gd name="connsiteX4" fmla="*/ 397900 w 402078"/>
+              <a:gd name="connsiteY4" fmla="*/ 2210462 h 3021495"/>
+              <a:gd name="connsiteX5" fmla="*/ 215020 w 402078"/>
+              <a:gd name="connsiteY5" fmla="*/ 2711394 h 3021495"/>
+              <a:gd name="connsiteX6" fmla="*/ 318387 w 402078"/>
+              <a:gd name="connsiteY6" fmla="*/ 3021495 h 3021495"/>
+              <a:gd name="connsiteX0" fmla="*/ 323766 w 440586"/>
+              <a:gd name="connsiteY0" fmla="*/ 0 h 3021495"/>
+              <a:gd name="connsiteX1" fmla="*/ 204496 w 440586"/>
+              <a:gd name="connsiteY1" fmla="*/ 294198 h 3021495"/>
+              <a:gd name="connsiteX2" fmla="*/ 363523 w 440586"/>
+              <a:gd name="connsiteY2" fmla="*/ 771276 h 3021495"/>
+              <a:gd name="connsiteX3" fmla="*/ 305 w 440586"/>
+              <a:gd name="connsiteY3" fmla="*/ 1358023 h 3021495"/>
+              <a:gd name="connsiteX4" fmla="*/ 435084 w 440586"/>
+              <a:gd name="connsiteY4" fmla="*/ 2210462 h 3021495"/>
+              <a:gd name="connsiteX5" fmla="*/ 252204 w 440586"/>
+              <a:gd name="connsiteY5" fmla="*/ 2711394 h 3021495"/>
+              <a:gd name="connsiteX6" fmla="*/ 355571 w 440586"/>
+              <a:gd name="connsiteY6" fmla="*/ 3021495 h 3021495"/>
+              <a:gd name="connsiteX0" fmla="*/ 323766 w 440586"/>
+              <a:gd name="connsiteY0" fmla="*/ 0 h 3021495"/>
+              <a:gd name="connsiteX1" fmla="*/ 204496 w 440586"/>
+              <a:gd name="connsiteY1" fmla="*/ 294198 h 3021495"/>
+              <a:gd name="connsiteX2" fmla="*/ 363523 w 440586"/>
+              <a:gd name="connsiteY2" fmla="*/ 771276 h 3021495"/>
+              <a:gd name="connsiteX3" fmla="*/ 305 w 440586"/>
+              <a:gd name="connsiteY3" fmla="*/ 1378622 h 3021495"/>
+              <a:gd name="connsiteX4" fmla="*/ 435084 w 440586"/>
+              <a:gd name="connsiteY4" fmla="*/ 2210462 h 3021495"/>
+              <a:gd name="connsiteX5" fmla="*/ 252204 w 440586"/>
+              <a:gd name="connsiteY5" fmla="*/ 2711394 h 3021495"/>
+              <a:gd name="connsiteX6" fmla="*/ 355571 w 440586"/>
+              <a:gd name="connsiteY6" fmla="*/ 3021495 h 3021495"/>
+              <a:gd name="connsiteX0" fmla="*/ 323766 w 440586"/>
+              <a:gd name="connsiteY0" fmla="*/ 0 h 3021495"/>
+              <a:gd name="connsiteX1" fmla="*/ 204496 w 440586"/>
+              <a:gd name="connsiteY1" fmla="*/ 294198 h 3021495"/>
+              <a:gd name="connsiteX2" fmla="*/ 363523 w 440586"/>
+              <a:gd name="connsiteY2" fmla="*/ 697118 h 3021495"/>
+              <a:gd name="connsiteX3" fmla="*/ 305 w 440586"/>
+              <a:gd name="connsiteY3" fmla="*/ 1378622 h 3021495"/>
+              <a:gd name="connsiteX4" fmla="*/ 435084 w 440586"/>
+              <a:gd name="connsiteY4" fmla="*/ 2210462 h 3021495"/>
+              <a:gd name="connsiteX5" fmla="*/ 252204 w 440586"/>
+              <a:gd name="connsiteY5" fmla="*/ 2711394 h 3021495"/>
+              <a:gd name="connsiteX6" fmla="*/ 355571 w 440586"/>
+              <a:gd name="connsiteY6" fmla="*/ 3021495 h 3021495"/>
+              <a:gd name="connsiteX0" fmla="*/ 307830 w 424067"/>
+              <a:gd name="connsiteY0" fmla="*/ 0 h 3021495"/>
+              <a:gd name="connsiteX1" fmla="*/ 188560 w 424067"/>
+              <a:gd name="connsiteY1" fmla="*/ 294198 h 3021495"/>
+              <a:gd name="connsiteX2" fmla="*/ 347587 w 424067"/>
+              <a:gd name="connsiteY2" fmla="*/ 697118 h 3021495"/>
+              <a:gd name="connsiteX3" fmla="*/ 318 w 424067"/>
+              <a:gd name="connsiteY3" fmla="*/ 1316823 h 3021495"/>
+              <a:gd name="connsiteX4" fmla="*/ 419148 w 424067"/>
+              <a:gd name="connsiteY4" fmla="*/ 2210462 h 3021495"/>
+              <a:gd name="connsiteX5" fmla="*/ 236268 w 424067"/>
+              <a:gd name="connsiteY5" fmla="*/ 2711394 h 3021495"/>
+              <a:gd name="connsiteX6" fmla="*/ 339635 w 424067"/>
+              <a:gd name="connsiteY6" fmla="*/ 3021495 h 3021495"/>
+              <a:gd name="connsiteX0" fmla="*/ 309023 w 514276"/>
+              <a:gd name="connsiteY0" fmla="*/ 0 h 3021495"/>
+              <a:gd name="connsiteX1" fmla="*/ 189753 w 514276"/>
+              <a:gd name="connsiteY1" fmla="*/ 294198 h 3021495"/>
+              <a:gd name="connsiteX2" fmla="*/ 348780 w 514276"/>
+              <a:gd name="connsiteY2" fmla="*/ 697118 h 3021495"/>
+              <a:gd name="connsiteX3" fmla="*/ 1511 w 514276"/>
+              <a:gd name="connsiteY3" fmla="*/ 1316823 h 3021495"/>
+              <a:gd name="connsiteX4" fmla="*/ 510718 w 514276"/>
+              <a:gd name="connsiteY4" fmla="*/ 1909709 h 3021495"/>
+              <a:gd name="connsiteX5" fmla="*/ 237461 w 514276"/>
+              <a:gd name="connsiteY5" fmla="*/ 2711394 h 3021495"/>
+              <a:gd name="connsiteX6" fmla="*/ 340828 w 514276"/>
+              <a:gd name="connsiteY6" fmla="*/ 3021495 h 3021495"/>
+              <a:gd name="connsiteX0" fmla="*/ 309023 w 510733"/>
+              <a:gd name="connsiteY0" fmla="*/ 0 h 3021495"/>
+              <a:gd name="connsiteX1" fmla="*/ 189753 w 510733"/>
+              <a:gd name="connsiteY1" fmla="*/ 294198 h 3021495"/>
+              <a:gd name="connsiteX2" fmla="*/ 348780 w 510733"/>
+              <a:gd name="connsiteY2" fmla="*/ 697118 h 3021495"/>
+              <a:gd name="connsiteX3" fmla="*/ 1511 w 510733"/>
+              <a:gd name="connsiteY3" fmla="*/ 1316823 h 3021495"/>
+              <a:gd name="connsiteX4" fmla="*/ 510718 w 510733"/>
+              <a:gd name="connsiteY4" fmla="*/ 1909709 h 3021495"/>
+              <a:gd name="connsiteX5" fmla="*/ 237461 w 510733"/>
+              <a:gd name="connsiteY5" fmla="*/ 2711394 h 3021495"/>
+              <a:gd name="connsiteX6" fmla="*/ 340828 w 510733"/>
+              <a:gd name="connsiteY6" fmla="*/ 3021495 h 3021495"/>
+              <a:gd name="connsiteX0" fmla="*/ 309023 w 511303"/>
+              <a:gd name="connsiteY0" fmla="*/ 0 h 3021495"/>
+              <a:gd name="connsiteX1" fmla="*/ 189753 w 511303"/>
+              <a:gd name="connsiteY1" fmla="*/ 294198 h 3021495"/>
+              <a:gd name="connsiteX2" fmla="*/ 348780 w 511303"/>
+              <a:gd name="connsiteY2" fmla="*/ 697118 h 3021495"/>
+              <a:gd name="connsiteX3" fmla="*/ 1511 w 511303"/>
+              <a:gd name="connsiteY3" fmla="*/ 1316823 h 3021495"/>
+              <a:gd name="connsiteX4" fmla="*/ 510718 w 511303"/>
+              <a:gd name="connsiteY4" fmla="*/ 1909709 h 3021495"/>
+              <a:gd name="connsiteX5" fmla="*/ 109871 w 511303"/>
+              <a:gd name="connsiteY5" fmla="*/ 2666076 h 3021495"/>
+              <a:gd name="connsiteX6" fmla="*/ 340828 w 511303"/>
+              <a:gd name="connsiteY6" fmla="*/ 3021495 h 3021495"/>
+              <a:gd name="connsiteX0" fmla="*/ 293134 w 495259"/>
+              <a:gd name="connsiteY0" fmla="*/ 0 h 3021495"/>
+              <a:gd name="connsiteX1" fmla="*/ 173864 w 495259"/>
+              <a:gd name="connsiteY1" fmla="*/ 294198 h 3021495"/>
+              <a:gd name="connsiteX2" fmla="*/ 332891 w 495259"/>
+              <a:gd name="connsiteY2" fmla="*/ 697118 h 3021495"/>
+              <a:gd name="connsiteX3" fmla="*/ 1570 w 495259"/>
+              <a:gd name="connsiteY3" fmla="*/ 1172627 h 3021495"/>
+              <a:gd name="connsiteX4" fmla="*/ 494829 w 495259"/>
+              <a:gd name="connsiteY4" fmla="*/ 1909709 h 3021495"/>
+              <a:gd name="connsiteX5" fmla="*/ 93982 w 495259"/>
+              <a:gd name="connsiteY5" fmla="*/ 2666076 h 3021495"/>
+              <a:gd name="connsiteX6" fmla="*/ 324939 w 495259"/>
+              <a:gd name="connsiteY6" fmla="*/ 3021495 h 3021495"/>
+              <a:gd name="connsiteX0" fmla="*/ 293038 w 495163"/>
+              <a:gd name="connsiteY0" fmla="*/ 0 h 3021495"/>
+              <a:gd name="connsiteX1" fmla="*/ 35544 w 495163"/>
+              <a:gd name="connsiteY1" fmla="*/ 236519 h 3021495"/>
+              <a:gd name="connsiteX2" fmla="*/ 332795 w 495163"/>
+              <a:gd name="connsiteY2" fmla="*/ 697118 h 3021495"/>
+              <a:gd name="connsiteX3" fmla="*/ 1474 w 495163"/>
+              <a:gd name="connsiteY3" fmla="*/ 1172627 h 3021495"/>
+              <a:gd name="connsiteX4" fmla="*/ 494733 w 495163"/>
+              <a:gd name="connsiteY4" fmla="*/ 1909709 h 3021495"/>
+              <a:gd name="connsiteX5" fmla="*/ 93886 w 495163"/>
+              <a:gd name="connsiteY5" fmla="*/ 2666076 h 3021495"/>
+              <a:gd name="connsiteX6" fmla="*/ 324843 w 495163"/>
+              <a:gd name="connsiteY6" fmla="*/ 3021495 h 3021495"/>
+              <a:gd name="connsiteX0" fmla="*/ 293276 w 495401"/>
+              <a:gd name="connsiteY0" fmla="*/ 0 h 3021495"/>
+              <a:gd name="connsiteX1" fmla="*/ 35782 w 495401"/>
+              <a:gd name="connsiteY1" fmla="*/ 236519 h 3021495"/>
+              <a:gd name="connsiteX2" fmla="*/ 350629 w 495401"/>
+              <a:gd name="connsiteY2" fmla="*/ 547391 h 3021495"/>
+              <a:gd name="connsiteX3" fmla="*/ 333033 w 495401"/>
+              <a:gd name="connsiteY3" fmla="*/ 697118 h 3021495"/>
+              <a:gd name="connsiteX4" fmla="*/ 1712 w 495401"/>
+              <a:gd name="connsiteY4" fmla="*/ 1172627 h 3021495"/>
+              <a:gd name="connsiteX5" fmla="*/ 494971 w 495401"/>
+              <a:gd name="connsiteY5" fmla="*/ 1909709 h 3021495"/>
+              <a:gd name="connsiteX6" fmla="*/ 94124 w 495401"/>
+              <a:gd name="connsiteY6" fmla="*/ 2666076 h 3021495"/>
+              <a:gd name="connsiteX7" fmla="*/ 325081 w 495401"/>
+              <a:gd name="connsiteY7" fmla="*/ 3021495 h 3021495"/>
+              <a:gd name="connsiteX0" fmla="*/ 293601 w 511659"/>
+              <a:gd name="connsiteY0" fmla="*/ 0 h 3021495"/>
+              <a:gd name="connsiteX1" fmla="*/ 36107 w 511659"/>
+              <a:gd name="connsiteY1" fmla="*/ 236519 h 3021495"/>
+              <a:gd name="connsiteX2" fmla="*/ 350954 w 511659"/>
+              <a:gd name="connsiteY2" fmla="*/ 547391 h 3021495"/>
+              <a:gd name="connsiteX3" fmla="*/ 333358 w 511659"/>
+              <a:gd name="connsiteY3" fmla="*/ 697118 h 3021495"/>
+              <a:gd name="connsiteX4" fmla="*/ 2037 w 511659"/>
+              <a:gd name="connsiteY4" fmla="*/ 1172627 h 3021495"/>
+              <a:gd name="connsiteX5" fmla="*/ 511245 w 511659"/>
+              <a:gd name="connsiteY5" fmla="*/ 1757273 h 3021495"/>
+              <a:gd name="connsiteX6" fmla="*/ 94449 w 511659"/>
+              <a:gd name="connsiteY6" fmla="*/ 2666076 h 3021495"/>
+              <a:gd name="connsiteX7" fmla="*/ 325406 w 511659"/>
+              <a:gd name="connsiteY7" fmla="*/ 3021495 h 3021495"/>
+              <a:gd name="connsiteX0" fmla="*/ 293601 w 511334"/>
+              <a:gd name="connsiteY0" fmla="*/ 0 h 3021495"/>
+              <a:gd name="connsiteX1" fmla="*/ 36107 w 511334"/>
+              <a:gd name="connsiteY1" fmla="*/ 236519 h 3021495"/>
+              <a:gd name="connsiteX2" fmla="*/ 350954 w 511334"/>
+              <a:gd name="connsiteY2" fmla="*/ 547391 h 3021495"/>
+              <a:gd name="connsiteX3" fmla="*/ 333358 w 511334"/>
+              <a:gd name="connsiteY3" fmla="*/ 697118 h 3021495"/>
+              <a:gd name="connsiteX4" fmla="*/ 2037 w 511334"/>
+              <a:gd name="connsiteY4" fmla="*/ 1172627 h 3021495"/>
+              <a:gd name="connsiteX5" fmla="*/ 511245 w 511334"/>
+              <a:gd name="connsiteY5" fmla="*/ 1757273 h 3021495"/>
+              <a:gd name="connsiteX6" fmla="*/ 46602 w 511334"/>
+              <a:gd name="connsiteY6" fmla="*/ 2381804 h 3021495"/>
+              <a:gd name="connsiteX7" fmla="*/ 325406 w 511334"/>
+              <a:gd name="connsiteY7" fmla="*/ 3021495 h 3021495"/>
+              <a:gd name="connsiteX0" fmla="*/ 293617 w 511350"/>
+              <a:gd name="connsiteY0" fmla="*/ 0 h 3021495"/>
+              <a:gd name="connsiteX1" fmla="*/ 36123 w 511350"/>
+              <a:gd name="connsiteY1" fmla="*/ 236519 h 3021495"/>
+              <a:gd name="connsiteX2" fmla="*/ 366919 w 511350"/>
+              <a:gd name="connsiteY2" fmla="*/ 432033 h 3021495"/>
+              <a:gd name="connsiteX3" fmla="*/ 333374 w 511350"/>
+              <a:gd name="connsiteY3" fmla="*/ 697118 h 3021495"/>
+              <a:gd name="connsiteX4" fmla="*/ 2053 w 511350"/>
+              <a:gd name="connsiteY4" fmla="*/ 1172627 h 3021495"/>
+              <a:gd name="connsiteX5" fmla="*/ 511261 w 511350"/>
+              <a:gd name="connsiteY5" fmla="*/ 1757273 h 3021495"/>
+              <a:gd name="connsiteX6" fmla="*/ 46618 w 511350"/>
+              <a:gd name="connsiteY6" fmla="*/ 2381804 h 3021495"/>
+              <a:gd name="connsiteX7" fmla="*/ 325422 w 511350"/>
+              <a:gd name="connsiteY7" fmla="*/ 3021495 h 3021495"/>
+              <a:gd name="connsiteX0" fmla="*/ 293617 w 511373"/>
+              <a:gd name="connsiteY0" fmla="*/ 0 h 3021495"/>
+              <a:gd name="connsiteX1" fmla="*/ 36123 w 511373"/>
+              <a:gd name="connsiteY1" fmla="*/ 236519 h 3021495"/>
+              <a:gd name="connsiteX2" fmla="*/ 366919 w 511373"/>
+              <a:gd name="connsiteY2" fmla="*/ 432033 h 3021495"/>
+              <a:gd name="connsiteX3" fmla="*/ 333374 w 511373"/>
+              <a:gd name="connsiteY3" fmla="*/ 697118 h 3021495"/>
+              <a:gd name="connsiteX4" fmla="*/ 2053 w 511373"/>
+              <a:gd name="connsiteY4" fmla="*/ 1172627 h 3021495"/>
+              <a:gd name="connsiteX5" fmla="*/ 511261 w 511373"/>
+              <a:gd name="connsiteY5" fmla="*/ 1757273 h 3021495"/>
+              <a:gd name="connsiteX6" fmla="*/ 51934 w 511373"/>
+              <a:gd name="connsiteY6" fmla="*/ 2472442 h 3021495"/>
+              <a:gd name="connsiteX7" fmla="*/ 325422 w 511373"/>
+              <a:gd name="connsiteY7" fmla="*/ 3021495 h 3021495"/>
+              <a:gd name="connsiteX0" fmla="*/ 293617 w 511373"/>
+              <a:gd name="connsiteY0" fmla="*/ 0 h 3021495"/>
+              <a:gd name="connsiteX1" fmla="*/ 36123 w 511373"/>
+              <a:gd name="connsiteY1" fmla="*/ 150940 h 3021495"/>
+              <a:gd name="connsiteX2" fmla="*/ 366919 w 511373"/>
+              <a:gd name="connsiteY2" fmla="*/ 432033 h 3021495"/>
+              <a:gd name="connsiteX3" fmla="*/ 333374 w 511373"/>
+              <a:gd name="connsiteY3" fmla="*/ 697118 h 3021495"/>
+              <a:gd name="connsiteX4" fmla="*/ 2053 w 511373"/>
+              <a:gd name="connsiteY4" fmla="*/ 1172627 h 3021495"/>
+              <a:gd name="connsiteX5" fmla="*/ 511261 w 511373"/>
+              <a:gd name="connsiteY5" fmla="*/ 1757273 h 3021495"/>
+              <a:gd name="connsiteX6" fmla="*/ 51934 w 511373"/>
+              <a:gd name="connsiteY6" fmla="*/ 2472442 h 3021495"/>
+              <a:gd name="connsiteX7" fmla="*/ 325422 w 511373"/>
+              <a:gd name="connsiteY7" fmla="*/ 3021495 h 3021495"/>
+              <a:gd name="connsiteX0" fmla="*/ 293617 w 511373"/>
+              <a:gd name="connsiteY0" fmla="*/ 0 h 3021495"/>
+              <a:gd name="connsiteX1" fmla="*/ 36123 w 511373"/>
+              <a:gd name="connsiteY1" fmla="*/ 150940 h 3021495"/>
+              <a:gd name="connsiteX2" fmla="*/ 366919 w 511373"/>
+              <a:gd name="connsiteY2" fmla="*/ 432033 h 3021495"/>
+              <a:gd name="connsiteX3" fmla="*/ 333374 w 511373"/>
+              <a:gd name="connsiteY3" fmla="*/ 697118 h 3021495"/>
+              <a:gd name="connsiteX4" fmla="*/ 2053 w 511373"/>
+              <a:gd name="connsiteY4" fmla="*/ 1172627 h 3021495"/>
+              <a:gd name="connsiteX5" fmla="*/ 511261 w 511373"/>
+              <a:gd name="connsiteY5" fmla="*/ 1757273 h 3021495"/>
+              <a:gd name="connsiteX6" fmla="*/ 51934 w 511373"/>
+              <a:gd name="connsiteY6" fmla="*/ 2472442 h 3021495"/>
+              <a:gd name="connsiteX7" fmla="*/ 325422 w 511373"/>
+              <a:gd name="connsiteY7" fmla="*/ 3021495 h 3021495"/>
+            </a:gdLst>
+            <a:ahLst/>
+            <a:cxnLst>
+              <a:cxn ang="0">
+                <a:pos x="connsiteX0" y="connsiteY0"/>
+              </a:cxn>
+              <a:cxn ang="0">
+                <a:pos x="connsiteX1" y="connsiteY1"/>
+              </a:cxn>
+              <a:cxn ang="0">
+                <a:pos x="connsiteX2" y="connsiteY2"/>
+              </a:cxn>
+              <a:cxn ang="0">
+                <a:pos x="connsiteX3" y="connsiteY3"/>
+              </a:cxn>
+              <a:cxn ang="0">
+                <a:pos x="connsiteX4" y="connsiteY4"/>
+              </a:cxn>
+              <a:cxn ang="0">
+                <a:pos x="connsiteX5" y="connsiteY5"/>
+              </a:cxn>
+              <a:cxn ang="0">
+                <a:pos x="connsiteX6" y="connsiteY6"/>
+              </a:cxn>
+              <a:cxn ang="0">
+                <a:pos x="connsiteX7" y="connsiteY7"/>
+              </a:cxn>
+            </a:cxnLst>
+            <a:rect l="l" t="t" r="r" b="b"/>
+            <a:pathLst>
+              <a:path w="511373" h="3021495">
+                <a:moveTo>
+                  <a:pt x="293617" y="0"/>
+                </a:moveTo>
+                <a:cubicBezTo>
+                  <a:pt x="39283" y="5397"/>
+                  <a:pt x="23906" y="78934"/>
+                  <a:pt x="36123" y="150940"/>
+                </a:cubicBezTo>
+                <a:cubicBezTo>
+                  <a:pt x="48340" y="222946"/>
+                  <a:pt x="317377" y="355267"/>
+                  <a:pt x="366919" y="432033"/>
+                </a:cubicBezTo>
+                <a:cubicBezTo>
+                  <a:pt x="416461" y="508799"/>
+                  <a:pt x="394185" y="573686"/>
+                  <a:pt x="333374" y="697118"/>
+                </a:cubicBezTo>
+                <a:cubicBezTo>
+                  <a:pt x="272563" y="820550"/>
+                  <a:pt x="-27595" y="995935"/>
+                  <a:pt x="2053" y="1172627"/>
+                </a:cubicBezTo>
+                <a:cubicBezTo>
+                  <a:pt x="31701" y="1349319"/>
+                  <a:pt x="502948" y="1540637"/>
+                  <a:pt x="511261" y="1757273"/>
+                </a:cubicBezTo>
+                <a:cubicBezTo>
+                  <a:pt x="519574" y="1973909"/>
+                  <a:pt x="65186" y="2337270"/>
+                  <a:pt x="51934" y="2472442"/>
+                </a:cubicBezTo>
+                <a:cubicBezTo>
+                  <a:pt x="38682" y="2607614"/>
+                  <a:pt x="267112" y="2934030"/>
+                  <a:pt x="325422" y="3021495"/>
+                </a:cubicBezTo>
+              </a:path>
+            </a:pathLst>
+          </a:custGeom>
+          <a:noFill/>
+          <a:ln>
+            <a:prstDash val="lgDash"/>
+          </a:ln>
+        </p:spPr>
+        <p:style>
+          <a:lnRef idx="2">
+            <a:schemeClr val="accent1">
+              <a:shade val="50000"/>
+            </a:schemeClr>
+          </a:lnRef>
+          <a:fillRef idx="1">
+            <a:schemeClr val="accent1"/>
+          </a:fillRef>
+          <a:effectRef idx="0">
+            <a:schemeClr val="accent1"/>
+          </a:effectRef>
+          <a:fontRef idx="minor">
+            <a:schemeClr val="lt1"/>
+          </a:fontRef>
+        </p:style>
+        <p:txBody>
+          <a:bodyPr rtlCol="0" anchor="ctr"/>
+          <a:lstStyle/>
+          <a:p>
+            <a:pPr algn="ctr"/>
+            <a:endParaRPr lang="en-US" dirty="0"/>
+          </a:p>
+        </p:txBody>
+      </p:sp>
+      <p:cxnSp>
+        <p:nvCxnSpPr>
+          <p:cNvPr id="134" name="Straight Connector 133">
+            <a:extLst>
+              <a:ext uri="{FF2B5EF4-FFF2-40B4-BE49-F238E27FC236}">
+                <a16:creationId xmlns:a16="http://schemas.microsoft.com/office/drawing/2014/main" id="{7DCD85EC-9FE1-43BC-999D-B01B21928153}"/>
+              </a:ext>
+            </a:extLst>
+          </p:cNvPr>
+          <p:cNvCxnSpPr>
+            <a:cxnSpLocks/>
+          </p:cNvCxnSpPr>
+          <p:nvPr/>
+        </p:nvCxnSpPr>
+        <p:spPr>
+          <a:xfrm>
+            <a:off x="6151528" y="535967"/>
+            <a:ext cx="0" cy="3942055"/>
+          </a:xfrm>
+          <a:prstGeom prst="line">
+            <a:avLst/>
+          </a:prstGeom>
+          <a:noFill/>
+          <a:ln>
+            <a:prstDash val="lgDash"/>
+          </a:ln>
+        </p:spPr>
+        <p:style>
+          <a:lnRef idx="2">
+            <a:schemeClr val="accent1">
+              <a:shade val="50000"/>
+            </a:schemeClr>
+          </a:lnRef>
+          <a:fillRef idx="1">
+            <a:schemeClr val="accent1"/>
+          </a:fillRef>
+          <a:effectRef idx="0">
+            <a:schemeClr val="accent1"/>
+          </a:effectRef>
+          <a:fontRef idx="minor">
+            <a:schemeClr val="lt1"/>
+          </a:fontRef>
+        </p:style>
+      </p:cxnSp>
+      <p:grpSp>
+        <p:nvGrpSpPr>
+          <p:cNvPr id="69" name="Group 68">
+            <a:extLst>
+              <a:ext uri="{FF2B5EF4-FFF2-40B4-BE49-F238E27FC236}">
+                <a16:creationId xmlns:a16="http://schemas.microsoft.com/office/drawing/2014/main" id="{33E3883F-2D63-4C9C-825B-98B1720D41A6}"/>
+              </a:ext>
+            </a:extLst>
+          </p:cNvPr>
+          <p:cNvGrpSpPr/>
+          <p:nvPr/>
+        </p:nvGrpSpPr>
+        <p:grpSpPr>
+          <a:xfrm>
+            <a:off x="648189" y="2697739"/>
+            <a:ext cx="721672" cy="503680"/>
+            <a:chOff x="1171779" y="995809"/>
+            <a:chExt cx="904845" cy="503680"/>
+          </a:xfrm>
+        </p:grpSpPr>
+        <p:sp>
+          <p:nvSpPr>
+            <p:cNvPr id="70" name="TextBox 69">
+              <a:extLst>
+                <a:ext uri="{FF2B5EF4-FFF2-40B4-BE49-F238E27FC236}">
+                  <a16:creationId xmlns:a16="http://schemas.microsoft.com/office/drawing/2014/main" id="{7F640BA2-F2FC-4E85-BF73-8669DB3D2CEE}"/>
+                </a:ext>
+              </a:extLst>
+            </p:cNvPr>
+            <p:cNvSpPr txBox="1"/>
+            <p:nvPr/>
+          </p:nvSpPr>
+          <p:spPr>
+            <a:xfrm>
+              <a:off x="1171779" y="995809"/>
+              <a:ext cx="904845" cy="276999"/>
+            </a:xfrm>
+            <a:prstGeom prst="rect">
+              <a:avLst/>
+            </a:prstGeom>
+            <a:noFill/>
+          </p:spPr>
+          <p:txBody>
+            <a:bodyPr wrap="none" rtlCol="0">
+              <a:spAutoFit/>
+            </a:bodyPr>
+            <a:lstStyle>
+              <a:defPPr>
+                <a:defRPr lang="en-US"/>
+              </a:defPPr>
+              <a:lvl1pPr>
+                <a:defRPr sz="1200">
+                  <a:latin typeface="Arial" panose="020B0604020202020204" pitchFamily="34" charset="0"/>
+                  <a:cs typeface="Arial" panose="020B0604020202020204" pitchFamily="34" charset="0"/>
+                </a:defRPr>
+              </a:lvl1pPr>
+            </a:lstStyle>
+            <a:p>
+              <a:r>
+                <a:rPr lang="en-US" i="1" dirty="0"/>
+                <a:t>Creates</a:t>
+              </a:r>
+            </a:p>
+          </p:txBody>
+        </p:sp>
+        <p:cxnSp>
+          <p:nvCxnSpPr>
+            <p:cNvPr id="73" name="Straight Arrow Connector 72">
+              <a:extLst>
+                <a:ext uri="{FF2B5EF4-FFF2-40B4-BE49-F238E27FC236}">
+                  <a16:creationId xmlns:a16="http://schemas.microsoft.com/office/drawing/2014/main" id="{C092AB3A-7332-46B8-BF10-7D3382374847}"/>
+                </a:ext>
+              </a:extLst>
+            </p:cNvPr>
+            <p:cNvCxnSpPr>
+              <a:cxnSpLocks/>
+            </p:cNvCxnSpPr>
+            <p:nvPr/>
+          </p:nvCxnSpPr>
+          <p:spPr>
+            <a:xfrm flipH="1">
+              <a:off x="1225745" y="1291114"/>
+              <a:ext cx="660999" cy="208375"/>
+            </a:xfrm>
+            <a:prstGeom prst="straightConnector1">
+              <a:avLst/>
+            </a:prstGeom>
+            <a:ln w="38100">
+              <a:headEnd type="triangle" w="med" len="med"/>
+              <a:tailEnd type="none" w="med" len="med"/>
+            </a:ln>
+          </p:spPr>
+          <p:style>
+            <a:lnRef idx="3">
+              <a:schemeClr val="dk1"/>
+            </a:lnRef>
+            <a:fillRef idx="0">
+              <a:schemeClr val="dk1"/>
+            </a:fillRef>
+            <a:effectRef idx="2">
+              <a:schemeClr val="dk1"/>
+            </a:effectRef>
+            <a:fontRef idx="minor">
+              <a:schemeClr val="tx1"/>
+            </a:fontRef>
+          </p:style>
+        </p:cxnSp>
+      </p:grpSp>
+      <p:grpSp>
+        <p:nvGrpSpPr>
+          <p:cNvPr id="76" name="Group 75">
+            <a:extLst>
+              <a:ext uri="{FF2B5EF4-FFF2-40B4-BE49-F238E27FC236}">
+                <a16:creationId xmlns:a16="http://schemas.microsoft.com/office/drawing/2014/main" id="{87309660-FCA4-4FF8-A7B8-263F40FDAE30}"/>
+              </a:ext>
+            </a:extLst>
+          </p:cNvPr>
+          <p:cNvGrpSpPr/>
+          <p:nvPr/>
+        </p:nvGrpSpPr>
+        <p:grpSpPr>
+          <a:xfrm>
+            <a:off x="1280573" y="2565319"/>
+            <a:ext cx="840882" cy="995098"/>
+            <a:chOff x="2379478" y="582986"/>
+            <a:chExt cx="840882" cy="995098"/>
+          </a:xfrm>
+        </p:grpSpPr>
+        <p:pic>
+          <p:nvPicPr>
+            <p:cNvPr id="77" name="Picture 76" descr="A close up of a sign&#10;&#10;Description automatically generated">
+              <a:extLst>
+                <a:ext uri="{FF2B5EF4-FFF2-40B4-BE49-F238E27FC236}">
+                  <a16:creationId xmlns:a16="http://schemas.microsoft.com/office/drawing/2014/main" id="{0922BD4C-7CC9-478E-946E-B4EC82218AF3}"/>
+                </a:ext>
+              </a:extLst>
+            </p:cNvPr>
+            <p:cNvPicPr>
+              <a:picLocks noChangeAspect="1"/>
+            </p:cNvPicPr>
+            <p:nvPr/>
+          </p:nvPicPr>
+          <p:blipFill>
+            <a:blip r:embed="rId6">
+              <a:extLst>
+                <a:ext uri="{28A0092B-C50C-407E-A947-70E740481C1C}">
+                  <a14:useLocalDpi xmlns:a14="http://schemas.microsoft.com/office/drawing/2010/main" val="0"/>
+                </a:ext>
+              </a:extLst>
+            </a:blip>
+            <a:stretch>
+              <a:fillRect/>
+            </a:stretch>
+          </p:blipFill>
+          <p:spPr>
+            <a:xfrm>
+              <a:off x="2495077" y="582986"/>
+              <a:ext cx="609685" cy="609685"/>
+            </a:xfrm>
+            <a:prstGeom prst="rect">
+              <a:avLst/>
+            </a:prstGeom>
+          </p:spPr>
+        </p:pic>
+        <p:sp>
+          <p:nvSpPr>
+            <p:cNvPr id="78" name="TextBox 77">
+              <a:extLst>
+                <a:ext uri="{FF2B5EF4-FFF2-40B4-BE49-F238E27FC236}">
+                  <a16:creationId xmlns:a16="http://schemas.microsoft.com/office/drawing/2014/main" id="{78C58DD6-C598-4197-83D6-6F93EA7AAE88}"/>
+                </a:ext>
+              </a:extLst>
+            </p:cNvPr>
+            <p:cNvSpPr txBox="1"/>
+            <p:nvPr/>
+          </p:nvSpPr>
+          <p:spPr>
+            <a:xfrm>
+              <a:off x="2379478" y="1116419"/>
+              <a:ext cx="840882" cy="461665"/>
+            </a:xfrm>
+            <a:prstGeom prst="rect">
+              <a:avLst/>
+            </a:prstGeom>
+            <a:noFill/>
+          </p:spPr>
+          <p:txBody>
+            <a:bodyPr wrap="square" rtlCol="0">
+              <a:spAutoFit/>
+            </a:bodyPr>
+            <a:lstStyle>
+              <a:defPPr>
+                <a:defRPr lang="en-US"/>
+              </a:defPPr>
+              <a:lvl1pPr>
+                <a:defRPr sz="1200">
+                  <a:latin typeface="Arial" panose="020B0604020202020204" pitchFamily="34" charset="0"/>
+                  <a:cs typeface="Arial" panose="020B0604020202020204" pitchFamily="34" charset="0"/>
+                </a:defRPr>
+              </a:lvl1pPr>
+            </a:lstStyle>
+            <a:p>
+              <a:pPr algn="ctr"/>
+              <a:r>
+                <a:rPr lang="en-US" dirty="0"/>
+                <a:t>Student Solution</a:t>
+              </a:r>
+            </a:p>
+          </p:txBody>
+        </p:sp>
+      </p:grpSp>
+      <p:cxnSp>
+        <p:nvCxnSpPr>
+          <p:cNvPr id="94" name="Straight Arrow Connector 93">
+            <a:extLst>
+              <a:ext uri="{FF2B5EF4-FFF2-40B4-BE49-F238E27FC236}">
+                <a16:creationId xmlns:a16="http://schemas.microsoft.com/office/drawing/2014/main" id="{87BB9290-FBF6-4711-A64F-D9DE9F8896F8}"/>
+              </a:ext>
+            </a:extLst>
+          </p:cNvPr>
+          <p:cNvCxnSpPr>
+            <a:cxnSpLocks/>
+          </p:cNvCxnSpPr>
+          <p:nvPr/>
+        </p:nvCxnSpPr>
+        <p:spPr>
+          <a:xfrm flipH="1">
+            <a:off x="1995939" y="2895265"/>
+            <a:ext cx="794613" cy="0"/>
+          </a:xfrm>
+          <a:prstGeom prst="straightConnector1">
+            <a:avLst/>
+          </a:prstGeom>
+          <a:ln w="38100">
+            <a:headEnd type="triangle" w="med" len="med"/>
+            <a:tailEnd type="none" w="med" len="med"/>
+          </a:ln>
+        </p:spPr>
+        <p:style>
+          <a:lnRef idx="3">
+            <a:schemeClr val="dk1"/>
+          </a:lnRef>
+          <a:fillRef idx="0">
+            <a:schemeClr val="dk1"/>
+          </a:fillRef>
+          <a:effectRef idx="2">
+            <a:schemeClr val="dk1"/>
+          </a:effectRef>
+          <a:fontRef idx="minor">
+            <a:schemeClr val="tx1"/>
+          </a:fontRef>
+        </p:style>
+      </p:cxnSp>
+      <p:sp>
+        <p:nvSpPr>
+          <p:cNvPr id="100" name="TextBox 99">
+            <a:extLst>
+              <a:ext uri="{FF2B5EF4-FFF2-40B4-BE49-F238E27FC236}">
+                <a16:creationId xmlns:a16="http://schemas.microsoft.com/office/drawing/2014/main" id="{E825FE19-99A1-4B88-92AE-F4F08559ABA9}"/>
+              </a:ext>
+            </a:extLst>
+          </p:cNvPr>
+          <p:cNvSpPr txBox="1"/>
+          <p:nvPr/>
+        </p:nvSpPr>
+        <p:spPr>
+          <a:xfrm>
+            <a:off x="3823510" y="247220"/>
+            <a:ext cx="1159293" cy="276999"/>
+          </a:xfrm>
+          <a:prstGeom prst="rect">
+            <a:avLst/>
+          </a:prstGeom>
+          <a:noFill/>
+        </p:spPr>
+        <p:txBody>
+          <a:bodyPr wrap="none" rtlCol="0">
+            <a:spAutoFit/>
+          </a:bodyPr>
+          <a:lstStyle/>
+          <a:p>
+            <a:pPr algn="ctr"/>
+            <a:r>
+              <a:rPr lang="en-US" sz="1200" b="1" dirty="0">
+                <a:latin typeface="Arial" panose="020B0604020202020204" pitchFamily="34" charset="0"/>
+                <a:cs typeface="Arial" panose="020B0604020202020204" pitchFamily="34" charset="0"/>
+              </a:rPr>
+              <a:t>Pedal Library</a:t>
+            </a:r>
+          </a:p>
+        </p:txBody>
+      </p:sp>
+      <p:pic>
+        <p:nvPicPr>
+          <p:cNvPr id="1026" name="Picture 2" descr="Bicycle Clipart, vector clip art online, royalty free design ... | Bicycle  drawing, Bike drawing, Simple bicycle">
+            <a:extLst>
+              <a:ext uri="{FF2B5EF4-FFF2-40B4-BE49-F238E27FC236}">
+                <a16:creationId xmlns:a16="http://schemas.microsoft.com/office/drawing/2014/main" id="{89EAFE9A-2349-4813-8715-C71F87E0BBBF}"/>
+              </a:ext>
+            </a:extLst>
+          </p:cNvPr>
+          <p:cNvPicPr>
+            <a:picLocks noChangeAspect="1" noChangeArrowheads="1"/>
+          </p:cNvPicPr>
+          <p:nvPr/>
+        </p:nvPicPr>
+        <p:blipFill>
+          <a:blip r:embed="rId10">
+            <a:extLst>
+              <a:ext uri="{28A0092B-C50C-407E-A947-70E740481C1C}">
+                <a14:useLocalDpi xmlns:a14="http://schemas.microsoft.com/office/drawing/2010/main" val="0"/>
+              </a:ext>
+            </a:extLst>
+          </a:blip>
+          <a:srcRect/>
+          <a:stretch>
+            <a:fillRect/>
+          </a:stretch>
+        </p:blipFill>
+        <p:spPr bwMode="auto">
+          <a:xfrm>
+            <a:off x="7018838" y="121521"/>
+            <a:ext cx="1364298" cy="835317"/>
+          </a:xfrm>
+          <a:prstGeom prst="rect">
+            <a:avLst/>
+          </a:prstGeom>
+          <a:noFill/>
+          <a:extLst>
+            <a:ext uri="{909E8E84-426E-40DD-AFC4-6F175D3DCCD1}">
+              <a14:hiddenFill xmlns:a14="http://schemas.microsoft.com/office/drawing/2010/main">
+                <a:solidFill>
+                  <a:srgbClr val="FFFFFF"/>
+                </a:solidFill>
+              </a14:hiddenFill>
+            </a:ext>
+          </a:extLst>
+        </p:spPr>
+      </p:pic>
+      <p:pic>
+        <p:nvPicPr>
+          <p:cNvPr id="86" name="Picture 85">
+            <a:extLst>
+              <a:ext uri="{FF2B5EF4-FFF2-40B4-BE49-F238E27FC236}">
+                <a16:creationId xmlns:a16="http://schemas.microsoft.com/office/drawing/2014/main" id="{372C4368-E7F7-400A-B066-0F96517E33A5}"/>
+              </a:ext>
+            </a:extLst>
+          </p:cNvPr>
+          <p:cNvPicPr>
+            <a:picLocks noChangeAspect="1"/>
+          </p:cNvPicPr>
+          <p:nvPr/>
+        </p:nvPicPr>
+        <p:blipFill>
+          <a:blip r:embed="rId7">
+            <a:extLst>
+              <a:ext uri="{28A0092B-C50C-407E-A947-70E740481C1C}">
+                <a14:useLocalDpi xmlns:a14="http://schemas.microsoft.com/office/drawing/2010/main" val="0"/>
+              </a:ext>
+            </a:extLst>
+          </a:blip>
+          <a:stretch>
+            <a:fillRect/>
+          </a:stretch>
+        </p:blipFill>
+        <p:spPr>
+          <a:xfrm>
+            <a:off x="7818631" y="384732"/>
+            <a:ext cx="640080" cy="640080"/>
+          </a:xfrm>
+          <a:prstGeom prst="rect">
+            <a:avLst/>
+          </a:prstGeom>
+        </p:spPr>
+      </p:pic>
+      <p:sp>
+        <p:nvSpPr>
+          <p:cNvPr id="87" name="Oval 86">
+            <a:extLst>
+              <a:ext uri="{FF2B5EF4-FFF2-40B4-BE49-F238E27FC236}">
+                <a16:creationId xmlns:a16="http://schemas.microsoft.com/office/drawing/2014/main" id="{7692EAE4-F120-4A4A-9F63-76ECBE7EC0FE}"/>
+              </a:ext>
+            </a:extLst>
+          </p:cNvPr>
+          <p:cNvSpPr/>
+          <p:nvPr/>
+        </p:nvSpPr>
+        <p:spPr>
+          <a:xfrm>
+            <a:off x="7018838" y="484915"/>
+            <a:ext cx="457200" cy="457200"/>
+          </a:xfrm>
+          <a:prstGeom prst="ellipse">
+            <a:avLst/>
+          </a:prstGeom>
+          <a:solidFill>
+            <a:schemeClr val="bg1"/>
+          </a:solidFill>
+        </p:spPr>
+        <p:style>
+          <a:lnRef idx="2">
+            <a:schemeClr val="accent1">
+              <a:shade val="50000"/>
+            </a:schemeClr>
+          </a:lnRef>
+          <a:fillRef idx="1">
+            <a:schemeClr val="accent1"/>
+          </a:fillRef>
+          <a:effectRef idx="0">
+            <a:schemeClr val="accent1"/>
+          </a:effectRef>
+          <a:fontRef idx="minor">
+            <a:schemeClr val="lt1"/>
+          </a:fontRef>
+        </p:style>
+        <p:txBody>
+          <a:bodyPr rtlCol="0" anchor="ctr"/>
+          <a:lstStyle/>
+          <a:p>
+            <a:pPr algn="ctr"/>
+            <a:endParaRPr lang="en-US"/>
+          </a:p>
+        </p:txBody>
+      </p:sp>
+      <p:pic>
+        <p:nvPicPr>
+          <p:cNvPr id="1028" name="Picture 4">
+            <a:extLst>
+              <a:ext uri="{FF2B5EF4-FFF2-40B4-BE49-F238E27FC236}">
+                <a16:creationId xmlns:a16="http://schemas.microsoft.com/office/drawing/2014/main" id="{576EC200-17D6-47FD-BEC4-03915AE5713D}"/>
+              </a:ext>
+            </a:extLst>
+          </p:cNvPr>
+          <p:cNvPicPr>
+            <a:picLocks noChangeAspect="1" noChangeArrowheads="1"/>
+          </p:cNvPicPr>
+          <p:nvPr/>
+        </p:nvPicPr>
+        <p:blipFill>
+          <a:blip r:embed="rId11">
+            <a:extLst>
+              <a:ext uri="{28A0092B-C50C-407E-A947-70E740481C1C}">
+                <a14:useLocalDpi xmlns:a14="http://schemas.microsoft.com/office/drawing/2010/main" val="0"/>
+              </a:ext>
+            </a:extLst>
+          </a:blip>
+          <a:srcRect/>
+          <a:stretch>
+            <a:fillRect/>
+          </a:stretch>
+        </p:blipFill>
+        <p:spPr bwMode="auto">
+          <a:xfrm>
+            <a:off x="7073203" y="544058"/>
+            <a:ext cx="338914" cy="338914"/>
+          </a:xfrm>
+          <a:prstGeom prst="rect">
+            <a:avLst/>
+          </a:prstGeom>
+          <a:noFill/>
+          <a:extLst>
+            <a:ext uri="{909E8E84-426E-40DD-AFC4-6F175D3DCCD1}">
+              <a14:hiddenFill xmlns:a14="http://schemas.microsoft.com/office/drawing/2010/main">
+                <a:solidFill>
+                  <a:srgbClr val="FFFFFF"/>
+                </a:solidFill>
+              </a14:hiddenFill>
+            </a:ext>
+          </a:extLst>
+        </p:spPr>
+      </p:pic>
+      <p:sp>
+        <p:nvSpPr>
+          <p:cNvPr id="55" name="Rectangle 54">
+            <a:extLst>
+              <a:ext uri="{FF2B5EF4-FFF2-40B4-BE49-F238E27FC236}">
+                <a16:creationId xmlns:a16="http://schemas.microsoft.com/office/drawing/2014/main" id="{75B4AB05-6CF7-431C-8A81-6B97F26094AE}"/>
+              </a:ext>
+            </a:extLst>
+          </p:cNvPr>
+          <p:cNvSpPr/>
+          <p:nvPr/>
+        </p:nvSpPr>
+        <p:spPr>
+          <a:xfrm>
+            <a:off x="2807724" y="637989"/>
+            <a:ext cx="3119380" cy="1459100"/>
+          </a:xfrm>
+          <a:prstGeom prst="rect">
+            <a:avLst/>
+          </a:prstGeom>
+          <a:ln>
+            <a:solidFill>
+              <a:schemeClr val="accent1"/>
+            </a:solidFill>
+            <a:prstDash val="sysDot"/>
+          </a:ln>
+        </p:spPr>
+        <p:style>
+          <a:lnRef idx="2">
+            <a:schemeClr val="dk1"/>
+          </a:lnRef>
+          <a:fillRef idx="1">
+            <a:schemeClr val="lt1"/>
+          </a:fillRef>
+          <a:effectRef idx="0">
+            <a:schemeClr val="dk1"/>
+          </a:effectRef>
+          <a:fontRef idx="minor">
+            <a:schemeClr val="dk1"/>
+          </a:fontRef>
+        </p:style>
+        <p:txBody>
+          <a:bodyPr rtlCol="0" anchor="t"/>
+          <a:lstStyle/>
+          <a:p>
+            <a:r>
+              <a:rPr lang="en-US" sz="1200" b="1" dirty="0">
+                <a:latin typeface="Arial" panose="020B0604020202020204" pitchFamily="34" charset="0"/>
+                <a:cs typeface="Arial" panose="020B0604020202020204" pitchFamily="34" charset="0"/>
+              </a:rPr>
+              <a:t>Tools</a:t>
+            </a:r>
+          </a:p>
+        </p:txBody>
+      </p:sp>
+      <p:sp>
+        <p:nvSpPr>
+          <p:cNvPr id="22" name="Rectangle 21">
+            <a:extLst>
+              <a:ext uri="{FF2B5EF4-FFF2-40B4-BE49-F238E27FC236}">
+                <a16:creationId xmlns:a16="http://schemas.microsoft.com/office/drawing/2014/main" id="{40E4EDA8-0C53-49CC-A58C-022E51C2727A}"/>
+              </a:ext>
+            </a:extLst>
+          </p:cNvPr>
+          <p:cNvSpPr/>
+          <p:nvPr/>
+        </p:nvSpPr>
+        <p:spPr>
+          <a:xfrm>
+            <a:off x="2887083" y="920646"/>
+            <a:ext cx="758952" cy="502920"/>
+          </a:xfrm>
+          <a:prstGeom prst="rect">
+            <a:avLst/>
+          </a:prstGeom>
+        </p:spPr>
+        <p:style>
+          <a:lnRef idx="2">
+            <a:schemeClr val="dk1"/>
+          </a:lnRef>
+          <a:fillRef idx="1">
+            <a:schemeClr val="lt1"/>
+          </a:fillRef>
+          <a:effectRef idx="0">
+            <a:schemeClr val="dk1"/>
+          </a:effectRef>
+          <a:fontRef idx="minor">
+            <a:schemeClr val="dk1"/>
+          </a:fontRef>
+        </p:style>
+        <p:txBody>
+          <a:bodyPr rot="0" spcFirstLastPara="0" vertOverflow="overflow" horzOverflow="overflow" vert="horz" wrap="square" lIns="51435" tIns="25718" rIns="51435" bIns="25718" numCol="1" spcCol="0" rtlCol="0" fromWordArt="0" anchor="t" anchorCtr="0" forceAA="0" compatLnSpc="1">
+            <a:prstTxWarp prst="textNoShape">
+              <a:avLst/>
+            </a:prstTxWarp>
+            <a:noAutofit/>
+          </a:bodyPr>
+          <a:lstStyle/>
+          <a:p>
+            <a:r>
+              <a:rPr lang="en-US" sz="1000" b="1" dirty="0">
+                <a:latin typeface="Arial" panose="020B0604020202020204" pitchFamily="34" charset="0"/>
+                <a:cs typeface="Arial" panose="020B0604020202020204" pitchFamily="34" charset="0"/>
+              </a:rPr>
+              <a:t>Source</a:t>
+            </a:r>
+          </a:p>
+          <a:p>
+            <a:r>
+              <a:rPr lang="en-US" sz="1000" dirty="0">
+                <a:latin typeface="Arial" panose="020B0604020202020204" pitchFamily="34" charset="0"/>
+                <a:cs typeface="Arial" panose="020B0604020202020204" pitchFamily="34" charset="0"/>
+              </a:rPr>
+              <a:t>Syntax verification</a:t>
+            </a:r>
+          </a:p>
+        </p:txBody>
+      </p:sp>
+      <p:sp>
+        <p:nvSpPr>
+          <p:cNvPr id="23" name="Rectangle 22">
+            <a:extLst>
+              <a:ext uri="{FF2B5EF4-FFF2-40B4-BE49-F238E27FC236}">
+                <a16:creationId xmlns:a16="http://schemas.microsoft.com/office/drawing/2014/main" id="{24CAAC8C-30B8-4C95-A607-923E008E0E05}"/>
+              </a:ext>
+            </a:extLst>
+          </p:cNvPr>
+          <p:cNvSpPr/>
+          <p:nvPr/>
+        </p:nvSpPr>
+        <p:spPr>
+          <a:xfrm>
+            <a:off x="3798838" y="920646"/>
+            <a:ext cx="758952" cy="502920"/>
+          </a:xfrm>
+          <a:prstGeom prst="rect">
+            <a:avLst/>
+          </a:prstGeom>
+        </p:spPr>
+        <p:style>
+          <a:lnRef idx="2">
+            <a:schemeClr val="dk1"/>
+          </a:lnRef>
+          <a:fillRef idx="1">
+            <a:schemeClr val="lt1"/>
+          </a:fillRef>
+          <a:effectRef idx="0">
+            <a:schemeClr val="dk1"/>
+          </a:effectRef>
+          <a:fontRef idx="minor">
+            <a:schemeClr val="dk1"/>
+          </a:fontRef>
+        </p:style>
+        <p:txBody>
+          <a:bodyPr rot="0" spcFirstLastPara="0" vertOverflow="overflow" horzOverflow="overflow" vert="horz" wrap="square" lIns="51435" tIns="25718" rIns="51435" bIns="25718" numCol="1" spcCol="0" rtlCol="0" fromWordArt="0" anchor="t" anchorCtr="0" forceAA="0" compatLnSpc="1">
+            <a:prstTxWarp prst="textNoShape">
+              <a:avLst/>
+            </a:prstTxWarp>
+            <a:noAutofit/>
+          </a:bodyPr>
+          <a:lstStyle/>
+          <a:p>
+            <a:r>
+              <a:rPr lang="en-US" sz="1000" b="1" dirty="0">
+                <a:latin typeface="Arial" panose="020B0604020202020204" pitchFamily="34" charset="0"/>
+                <a:cs typeface="Arial" panose="020B0604020202020204" pitchFamily="34" charset="0"/>
+              </a:rPr>
+              <a:t>TIFA</a:t>
+            </a:r>
+          </a:p>
+          <a:p>
+            <a:r>
+              <a:rPr lang="en-US" sz="1000" dirty="0">
+                <a:latin typeface="Arial" panose="020B0604020202020204" pitchFamily="34" charset="0"/>
+                <a:cs typeface="Arial" panose="020B0604020202020204" pitchFamily="34" charset="0"/>
+              </a:rPr>
+              <a:t>Type/Flow checking</a:t>
+            </a:r>
+          </a:p>
+        </p:txBody>
+      </p:sp>
+      <p:sp>
+        <p:nvSpPr>
+          <p:cNvPr id="24" name="Rectangle 23">
+            <a:extLst>
+              <a:ext uri="{FF2B5EF4-FFF2-40B4-BE49-F238E27FC236}">
+                <a16:creationId xmlns:a16="http://schemas.microsoft.com/office/drawing/2014/main" id="{23E2D58A-A5E8-4471-A68B-F9F47F19EB07}"/>
+              </a:ext>
+            </a:extLst>
+          </p:cNvPr>
+          <p:cNvSpPr/>
+          <p:nvPr/>
+        </p:nvSpPr>
+        <p:spPr>
+          <a:xfrm>
+            <a:off x="4710592" y="920646"/>
+            <a:ext cx="758952" cy="502920"/>
+          </a:xfrm>
+          <a:prstGeom prst="rect">
+            <a:avLst/>
+          </a:prstGeom>
+        </p:spPr>
+        <p:style>
+          <a:lnRef idx="2">
+            <a:schemeClr val="dk1"/>
+          </a:lnRef>
+          <a:fillRef idx="1">
+            <a:schemeClr val="lt1"/>
+          </a:fillRef>
+          <a:effectRef idx="0">
+            <a:schemeClr val="dk1"/>
+          </a:effectRef>
+          <a:fontRef idx="minor">
+            <a:schemeClr val="dk1"/>
+          </a:fontRef>
+        </p:style>
+        <p:txBody>
+          <a:bodyPr rot="0" spcFirstLastPara="0" vertOverflow="overflow" horzOverflow="overflow" vert="horz" wrap="square" lIns="51435" tIns="25718" rIns="51435" bIns="25718" numCol="1" spcCol="0" rtlCol="0" fromWordArt="0" anchor="t" anchorCtr="0" forceAA="0" compatLnSpc="1">
+            <a:prstTxWarp prst="textNoShape">
+              <a:avLst/>
+            </a:prstTxWarp>
+            <a:noAutofit/>
+          </a:bodyPr>
+          <a:lstStyle/>
+          <a:p>
+            <a:r>
+              <a:rPr lang="en-US" sz="1000" b="1" dirty="0">
+                <a:latin typeface="Arial" panose="020B0604020202020204" pitchFamily="34" charset="0"/>
+                <a:cs typeface="Arial" panose="020B0604020202020204" pitchFamily="34" charset="0"/>
+              </a:rPr>
+              <a:t>CAIT</a:t>
+            </a:r>
+          </a:p>
+          <a:p>
+            <a:r>
+              <a:rPr lang="en-US" sz="1000" dirty="0">
+                <a:latin typeface="Arial" panose="020B0604020202020204" pitchFamily="34" charset="0"/>
+                <a:cs typeface="Arial" panose="020B0604020202020204" pitchFamily="34" charset="0"/>
+              </a:rPr>
+              <a:t>Find code patterns</a:t>
+            </a:r>
+          </a:p>
+        </p:txBody>
+      </p:sp>
+      <p:sp>
+        <p:nvSpPr>
+          <p:cNvPr id="26" name="Rectangle 25">
+            <a:extLst>
+              <a:ext uri="{FF2B5EF4-FFF2-40B4-BE49-F238E27FC236}">
+                <a16:creationId xmlns:a16="http://schemas.microsoft.com/office/drawing/2014/main" id="{21D0CCE0-AF1C-4772-B481-159FE7EC3A50}"/>
+              </a:ext>
+            </a:extLst>
+          </p:cNvPr>
+          <p:cNvSpPr/>
+          <p:nvPr/>
+        </p:nvSpPr>
+        <p:spPr>
+          <a:xfrm>
+            <a:off x="2887083" y="1560752"/>
+            <a:ext cx="758952" cy="502920"/>
+          </a:xfrm>
+          <a:prstGeom prst="rect">
+            <a:avLst/>
+          </a:prstGeom>
+        </p:spPr>
+        <p:style>
+          <a:lnRef idx="2">
+            <a:schemeClr val="dk1"/>
+          </a:lnRef>
+          <a:fillRef idx="1">
+            <a:schemeClr val="lt1"/>
+          </a:fillRef>
+          <a:effectRef idx="0">
+            <a:schemeClr val="dk1"/>
+          </a:effectRef>
+          <a:fontRef idx="minor">
+            <a:schemeClr val="dk1"/>
+          </a:fontRef>
+        </p:style>
+        <p:txBody>
+          <a:bodyPr rot="0" spcFirstLastPara="0" vertOverflow="overflow" horzOverflow="overflow" vert="horz" wrap="square" lIns="51435" tIns="25718" rIns="51435" bIns="25718" numCol="1" spcCol="0" rtlCol="0" fromWordArt="0" anchor="t" anchorCtr="0" forceAA="0" compatLnSpc="1">
+            <a:prstTxWarp prst="textNoShape">
+              <a:avLst/>
+            </a:prstTxWarp>
+            <a:noAutofit/>
+          </a:bodyPr>
+          <a:lstStyle/>
+          <a:p>
+            <a:r>
+              <a:rPr lang="en-US" sz="1000" b="1" dirty="0">
+                <a:latin typeface="Arial" panose="020B0604020202020204" pitchFamily="34" charset="0"/>
+                <a:cs typeface="Arial" panose="020B0604020202020204" pitchFamily="34" charset="0"/>
+              </a:rPr>
+              <a:t>Sandbox</a:t>
+            </a:r>
+          </a:p>
+          <a:p>
+            <a:r>
+              <a:rPr lang="en-US" sz="1000" dirty="0">
+                <a:latin typeface="Arial" panose="020B0604020202020204" pitchFamily="34" charset="0"/>
+                <a:cs typeface="Arial" panose="020B0604020202020204" pitchFamily="34" charset="0"/>
+              </a:rPr>
+              <a:t>Safely run</a:t>
+            </a:r>
+          </a:p>
+          <a:p>
+            <a:r>
+              <a:rPr lang="en-US" sz="1000" dirty="0">
+                <a:latin typeface="Arial" panose="020B0604020202020204" pitchFamily="34" charset="0"/>
+                <a:cs typeface="Arial" panose="020B0604020202020204" pitchFamily="34" charset="0"/>
+              </a:rPr>
+              <a:t>code</a:t>
+            </a:r>
+          </a:p>
+        </p:txBody>
+      </p:sp>
+      <p:sp>
+        <p:nvSpPr>
+          <p:cNvPr id="27" name="Rectangle 26">
+            <a:extLst>
+              <a:ext uri="{FF2B5EF4-FFF2-40B4-BE49-F238E27FC236}">
+                <a16:creationId xmlns:a16="http://schemas.microsoft.com/office/drawing/2014/main" id="{016598F6-3C15-46A4-A2A6-FFE50666475C}"/>
+              </a:ext>
+            </a:extLst>
+          </p:cNvPr>
+          <p:cNvSpPr/>
+          <p:nvPr/>
+        </p:nvSpPr>
+        <p:spPr>
+          <a:xfrm>
+            <a:off x="3798838" y="1560752"/>
+            <a:ext cx="758952" cy="502920"/>
+          </a:xfrm>
+          <a:prstGeom prst="rect">
+            <a:avLst/>
+          </a:prstGeom>
+        </p:spPr>
+        <p:style>
+          <a:lnRef idx="2">
+            <a:schemeClr val="dk1"/>
+          </a:lnRef>
+          <a:fillRef idx="1">
+            <a:schemeClr val="lt1"/>
+          </a:fillRef>
+          <a:effectRef idx="0">
+            <a:schemeClr val="dk1"/>
+          </a:effectRef>
+          <a:fontRef idx="minor">
+            <a:schemeClr val="dk1"/>
+          </a:fontRef>
+        </p:style>
+        <p:txBody>
+          <a:bodyPr rot="0" spcFirstLastPara="0" vertOverflow="overflow" horzOverflow="overflow" vert="horz" wrap="square" lIns="51435" tIns="25718" rIns="51435" bIns="25718" numCol="1" spcCol="0" rtlCol="0" fromWordArt="0" anchor="t" anchorCtr="0" forceAA="0" compatLnSpc="1">
+            <a:prstTxWarp prst="textNoShape">
+              <a:avLst/>
+            </a:prstTxWarp>
+            <a:noAutofit/>
+          </a:bodyPr>
+          <a:lstStyle/>
+          <a:p>
+            <a:r>
+              <a:rPr lang="en-US" sz="1000" b="1" dirty="0">
+                <a:latin typeface="Arial" panose="020B0604020202020204" pitchFamily="34" charset="0"/>
+                <a:cs typeface="Arial" panose="020B0604020202020204" pitchFamily="34" charset="0"/>
+              </a:rPr>
+              <a:t>Assertions</a:t>
+            </a:r>
+          </a:p>
+          <a:p>
+            <a:r>
+              <a:rPr lang="en-US" sz="1000" dirty="0">
+                <a:latin typeface="Arial" panose="020B0604020202020204" pitchFamily="34" charset="0"/>
+                <a:cs typeface="Arial" panose="020B0604020202020204" pitchFamily="34" charset="0"/>
+              </a:rPr>
+              <a:t>Declarative tests</a:t>
+            </a:r>
+          </a:p>
+        </p:txBody>
+      </p:sp>
+      <p:sp>
+        <p:nvSpPr>
+          <p:cNvPr id="122" name="Rectangle 121">
+            <a:extLst>
+              <a:ext uri="{FF2B5EF4-FFF2-40B4-BE49-F238E27FC236}">
+                <a16:creationId xmlns:a16="http://schemas.microsoft.com/office/drawing/2014/main" id="{D90C888D-8435-4177-A3C5-F34291B09C26}"/>
+              </a:ext>
+            </a:extLst>
+          </p:cNvPr>
+          <p:cNvSpPr/>
+          <p:nvPr/>
+        </p:nvSpPr>
+        <p:spPr>
+          <a:xfrm>
+            <a:off x="4710592" y="1560752"/>
+            <a:ext cx="758952" cy="502920"/>
+          </a:xfrm>
+          <a:prstGeom prst="rect">
+            <a:avLst/>
+          </a:prstGeom>
+        </p:spPr>
+        <p:style>
+          <a:lnRef idx="2">
+            <a:schemeClr val="dk1"/>
+          </a:lnRef>
+          <a:fillRef idx="1">
+            <a:schemeClr val="lt1"/>
+          </a:fillRef>
+          <a:effectRef idx="0">
+            <a:schemeClr val="dk1"/>
+          </a:effectRef>
+          <a:fontRef idx="minor">
+            <a:schemeClr val="dk1"/>
+          </a:fontRef>
+        </p:style>
+        <p:txBody>
+          <a:bodyPr rot="0" spcFirstLastPara="0" vertOverflow="overflow" horzOverflow="overflow" vert="horz" wrap="square" lIns="51435" tIns="25718" rIns="51435" bIns="25718" numCol="1" spcCol="0" rtlCol="0" fromWordArt="0" anchor="t" anchorCtr="0" forceAA="0" compatLnSpc="1">
+            <a:prstTxWarp prst="textNoShape">
+              <a:avLst/>
+            </a:prstTxWarp>
+            <a:noAutofit/>
+          </a:bodyPr>
+          <a:lstStyle/>
+          <a:p>
+            <a:r>
+              <a:rPr lang="en-US" sz="1000" b="1" dirty="0">
+                <a:latin typeface="Arial" panose="020B0604020202020204" pitchFamily="34" charset="0"/>
+                <a:cs typeface="Arial" panose="020B0604020202020204" pitchFamily="34" charset="0"/>
+              </a:rPr>
+              <a:t>Questions</a:t>
+            </a:r>
+          </a:p>
+          <a:p>
+            <a:r>
+              <a:rPr lang="en-US" sz="1000" dirty="0">
+                <a:latin typeface="Arial" panose="020B0604020202020204" pitchFamily="34" charset="0"/>
+                <a:cs typeface="Arial" panose="020B0604020202020204" pitchFamily="34" charset="0"/>
+              </a:rPr>
+              <a:t>Random</a:t>
+            </a:r>
+          </a:p>
+          <a:p>
+            <a:r>
+              <a:rPr lang="en-US" sz="1000" dirty="0">
+                <a:latin typeface="Arial" panose="020B0604020202020204" pitchFamily="34" charset="0"/>
+                <a:cs typeface="Arial" panose="020B0604020202020204" pitchFamily="34" charset="0"/>
+              </a:rPr>
+              <a:t>Pools</a:t>
+            </a:r>
+          </a:p>
+        </p:txBody>
+      </p:sp>
+      <p:sp>
+        <p:nvSpPr>
+          <p:cNvPr id="132" name="TextBox 131">
+            <a:extLst>
+              <a:ext uri="{FF2B5EF4-FFF2-40B4-BE49-F238E27FC236}">
+                <a16:creationId xmlns:a16="http://schemas.microsoft.com/office/drawing/2014/main" id="{2BB671A9-9F89-4F05-A428-712448D1506B}"/>
+              </a:ext>
+            </a:extLst>
+          </p:cNvPr>
+          <p:cNvSpPr txBox="1"/>
+          <p:nvPr/>
+        </p:nvSpPr>
+        <p:spPr>
+          <a:xfrm>
+            <a:off x="5518642" y="1148757"/>
+            <a:ext cx="469754" cy="369332"/>
+          </a:xfrm>
+          <a:prstGeom prst="rect">
+            <a:avLst/>
+          </a:prstGeom>
+          <a:noFill/>
+        </p:spPr>
+        <p:txBody>
+          <a:bodyPr wrap="square">
+            <a:spAutoFit/>
+          </a:bodyPr>
+          <a:lstStyle/>
+          <a:p>
+            <a:r>
+              <a:rPr lang="en-US" sz="1800" b="1" dirty="0">
+                <a:latin typeface="Arial" panose="020B0604020202020204" pitchFamily="34" charset="0"/>
+                <a:cs typeface="Arial" panose="020B0604020202020204" pitchFamily="34" charset="0"/>
+              </a:rPr>
+              <a:t>…</a:t>
+            </a:r>
+            <a:endParaRPr lang="en-US" dirty="0"/>
+          </a:p>
+        </p:txBody>
+      </p:sp>
+      <p:cxnSp>
+        <p:nvCxnSpPr>
+          <p:cNvPr id="139" name="Straight Connector 138">
+            <a:extLst>
+              <a:ext uri="{FF2B5EF4-FFF2-40B4-BE49-F238E27FC236}">
+                <a16:creationId xmlns:a16="http://schemas.microsoft.com/office/drawing/2014/main" id="{C51FB1A6-E1DE-4D20-9A76-4DB1A897AF43}"/>
+              </a:ext>
+            </a:extLst>
+          </p:cNvPr>
+          <p:cNvCxnSpPr>
+            <a:cxnSpLocks/>
+          </p:cNvCxnSpPr>
+          <p:nvPr/>
+        </p:nvCxnSpPr>
+        <p:spPr>
+          <a:xfrm>
+            <a:off x="2438347" y="535967"/>
+            <a:ext cx="3707272" cy="0"/>
+          </a:xfrm>
+          <a:prstGeom prst="line">
+            <a:avLst/>
+          </a:prstGeom>
+          <a:noFill/>
+          <a:ln>
+            <a:prstDash val="lgDash"/>
+          </a:ln>
+        </p:spPr>
+        <p:style>
+          <a:lnRef idx="2">
+            <a:schemeClr val="accent1">
+              <a:shade val="50000"/>
+            </a:schemeClr>
+          </a:lnRef>
+          <a:fillRef idx="1">
+            <a:schemeClr val="accent1"/>
+          </a:fillRef>
+          <a:effectRef idx="0">
+            <a:schemeClr val="accent1"/>
+          </a:effectRef>
+          <a:fontRef idx="minor">
+            <a:schemeClr val="lt1"/>
+          </a:fontRef>
+        </p:style>
+      </p:cxnSp>
+      <p:grpSp>
+        <p:nvGrpSpPr>
+          <p:cNvPr id="157" name="Group 156">
+            <a:extLst>
+              <a:ext uri="{FF2B5EF4-FFF2-40B4-BE49-F238E27FC236}">
+                <a16:creationId xmlns:a16="http://schemas.microsoft.com/office/drawing/2014/main" id="{2E5FC307-4F07-47F6-8BAC-607BC3D21C2B}"/>
+              </a:ext>
+            </a:extLst>
+          </p:cNvPr>
+          <p:cNvGrpSpPr/>
+          <p:nvPr/>
+        </p:nvGrpSpPr>
+        <p:grpSpPr>
+          <a:xfrm>
+            <a:off x="3747785" y="3755365"/>
+            <a:ext cx="952282" cy="739066"/>
+            <a:chOff x="4121705" y="1071528"/>
+            <a:chExt cx="952282" cy="739066"/>
+          </a:xfrm>
+        </p:grpSpPr>
+        <p:pic>
+          <p:nvPicPr>
+            <p:cNvPr id="149" name="Picture 148" descr="A close up of a logo&#10;&#10;Description automatically generated">
+              <a:extLst>
+                <a:ext uri="{FF2B5EF4-FFF2-40B4-BE49-F238E27FC236}">
+                  <a16:creationId xmlns:a16="http://schemas.microsoft.com/office/drawing/2014/main" id="{29BEBFA8-F34A-41F8-82A1-A07857DC6DF8}"/>
+                </a:ext>
+              </a:extLst>
+            </p:cNvPr>
+            <p:cNvPicPr>
+              <a:picLocks noChangeAspect="1"/>
+            </p:cNvPicPr>
+            <p:nvPr/>
+          </p:nvPicPr>
+          <p:blipFill>
+            <a:blip r:embed="rId12">
+              <a:extLst>
+                <a:ext uri="{28A0092B-C50C-407E-A947-70E740481C1C}">
+                  <a14:useLocalDpi xmlns:a14="http://schemas.microsoft.com/office/drawing/2010/main" val="0"/>
+                </a:ext>
+              </a:extLst>
+            </a:blip>
+            <a:stretch>
+              <a:fillRect/>
+            </a:stretch>
+          </p:blipFill>
+          <p:spPr>
+            <a:xfrm>
+              <a:off x="4304229" y="1071528"/>
+              <a:ext cx="457200" cy="457200"/>
+            </a:xfrm>
+            <a:prstGeom prst="rect">
+              <a:avLst/>
+            </a:prstGeom>
+          </p:spPr>
+        </p:pic>
+        <p:sp>
+          <p:nvSpPr>
+            <p:cNvPr id="154" name="TextBox 153">
+              <a:extLst>
+                <a:ext uri="{FF2B5EF4-FFF2-40B4-BE49-F238E27FC236}">
+                  <a16:creationId xmlns:a16="http://schemas.microsoft.com/office/drawing/2014/main" id="{E9C0C87F-F30D-4270-A9A8-D9CBDC4B4A14}"/>
+                </a:ext>
+              </a:extLst>
+            </p:cNvPr>
+            <p:cNvSpPr txBox="1"/>
+            <p:nvPr/>
+          </p:nvSpPr>
+          <p:spPr>
+            <a:xfrm>
+              <a:off x="4121705" y="1533595"/>
+              <a:ext cx="952282" cy="276999"/>
+            </a:xfrm>
+            <a:prstGeom prst="rect">
+              <a:avLst/>
+            </a:prstGeom>
+            <a:noFill/>
+          </p:spPr>
+          <p:txBody>
+            <a:bodyPr wrap="square" rtlCol="0">
+              <a:spAutoFit/>
+            </a:bodyPr>
+            <a:lstStyle/>
+            <a:p>
+              <a:pPr algn="ctr"/>
+              <a:r>
+                <a:rPr lang="en-US" sz="1200" dirty="0">
+                  <a:latin typeface="Arial" panose="020B0604020202020204" pitchFamily="34" charset="0"/>
+                  <a:cs typeface="Arial" panose="020B0604020202020204" pitchFamily="34" charset="0"/>
+                </a:rPr>
+                <a:t>Conditions</a:t>
+              </a:r>
+            </a:p>
+          </p:txBody>
+        </p:sp>
+      </p:grpSp>
+      <p:grpSp>
+        <p:nvGrpSpPr>
+          <p:cNvPr id="155" name="Group 154">
+            <a:extLst>
+              <a:ext uri="{FF2B5EF4-FFF2-40B4-BE49-F238E27FC236}">
+                <a16:creationId xmlns:a16="http://schemas.microsoft.com/office/drawing/2014/main" id="{A6CC269C-BB4B-4E9F-AD1A-2551B2C99FC7}"/>
+              </a:ext>
+            </a:extLst>
+          </p:cNvPr>
+          <p:cNvGrpSpPr/>
+          <p:nvPr/>
+        </p:nvGrpSpPr>
+        <p:grpSpPr>
+          <a:xfrm>
+            <a:off x="4879339" y="3695628"/>
+            <a:ext cx="952273" cy="782394"/>
+            <a:chOff x="5487702" y="973097"/>
+            <a:chExt cx="952273" cy="782394"/>
+          </a:xfrm>
+        </p:grpSpPr>
+        <p:pic>
+          <p:nvPicPr>
+            <p:cNvPr id="153" name="Picture 152" descr="A picture containing icon&#10;&#10;Description automatically generated">
+              <a:extLst>
+                <a:ext uri="{FF2B5EF4-FFF2-40B4-BE49-F238E27FC236}">
+                  <a16:creationId xmlns:a16="http://schemas.microsoft.com/office/drawing/2014/main" id="{C5DED0DA-2C80-44D0-AAC2-5E1391FA2318}"/>
+                </a:ext>
+              </a:extLst>
+            </p:cNvPr>
+            <p:cNvPicPr>
+              <a:picLocks noChangeAspect="1"/>
+            </p:cNvPicPr>
+            <p:nvPr/>
+          </p:nvPicPr>
+          <p:blipFill>
+            <a:blip r:embed="rId13">
+              <a:extLst>
+                <a:ext uri="{28A0092B-C50C-407E-A947-70E740481C1C}">
+                  <a14:useLocalDpi xmlns:a14="http://schemas.microsoft.com/office/drawing/2010/main" val="0"/>
+                </a:ext>
+              </a:extLst>
+            </a:blip>
+            <a:stretch>
+              <a:fillRect/>
+            </a:stretch>
+          </p:blipFill>
+          <p:spPr>
+            <a:xfrm>
+              <a:off x="5641972" y="973097"/>
+              <a:ext cx="548640" cy="548640"/>
+            </a:xfrm>
+            <a:prstGeom prst="rect">
+              <a:avLst/>
+            </a:prstGeom>
+          </p:spPr>
+        </p:pic>
+        <p:sp>
+          <p:nvSpPr>
+            <p:cNvPr id="158" name="TextBox 157">
+              <a:extLst>
+                <a:ext uri="{FF2B5EF4-FFF2-40B4-BE49-F238E27FC236}">
+                  <a16:creationId xmlns:a16="http://schemas.microsoft.com/office/drawing/2014/main" id="{46C21212-F96E-4111-816A-A10D487AD614}"/>
+                </a:ext>
+              </a:extLst>
+            </p:cNvPr>
+            <p:cNvSpPr txBox="1"/>
+            <p:nvPr/>
+          </p:nvSpPr>
+          <p:spPr>
+            <a:xfrm>
+              <a:off x="5487702" y="1478492"/>
+              <a:ext cx="952273" cy="276999"/>
+            </a:xfrm>
+            <a:prstGeom prst="rect">
+              <a:avLst/>
+            </a:prstGeom>
+            <a:noFill/>
+          </p:spPr>
+          <p:txBody>
+            <a:bodyPr wrap="square" rtlCol="0">
+              <a:spAutoFit/>
+            </a:bodyPr>
+            <a:lstStyle/>
+            <a:p>
+              <a:pPr algn="ctr"/>
+              <a:r>
+                <a:rPr lang="en-US" sz="1200" dirty="0">
+                  <a:latin typeface="Arial" panose="020B0604020202020204" pitchFamily="34" charset="0"/>
+                  <a:cs typeface="Arial" panose="020B0604020202020204" pitchFamily="34" charset="0"/>
+                </a:rPr>
+                <a:t>Responses</a:t>
+              </a:r>
+            </a:p>
+          </p:txBody>
+        </p:sp>
+      </p:grpSp>
+      <p:sp>
+        <p:nvSpPr>
+          <p:cNvPr id="165" name="TextBox 164">
+            <a:extLst>
+              <a:ext uri="{FF2B5EF4-FFF2-40B4-BE49-F238E27FC236}">
+                <a16:creationId xmlns:a16="http://schemas.microsoft.com/office/drawing/2014/main" id="{7F4E756B-1E40-4E38-90F8-4A9A9394CCD8}"/>
+              </a:ext>
+            </a:extLst>
+          </p:cNvPr>
+          <p:cNvSpPr txBox="1"/>
+          <p:nvPr/>
+        </p:nvSpPr>
+        <p:spPr>
+          <a:xfrm>
+            <a:off x="1935526" y="2633386"/>
+            <a:ext cx="739305" cy="276999"/>
+          </a:xfrm>
+          <a:prstGeom prst="rect">
+            <a:avLst/>
+          </a:prstGeom>
+          <a:noFill/>
+        </p:spPr>
+        <p:txBody>
+          <a:bodyPr wrap="none" rtlCol="0">
+            <a:spAutoFit/>
+          </a:bodyPr>
+          <a:lstStyle>
+            <a:defPPr>
+              <a:defRPr lang="en-US"/>
+            </a:defPPr>
+            <a:lvl1pPr>
+              <a:defRPr sz="1200">
+                <a:latin typeface="Arial" panose="020B0604020202020204" pitchFamily="34" charset="0"/>
+                <a:cs typeface="Arial" panose="020B0604020202020204" pitchFamily="34" charset="0"/>
+              </a:defRPr>
+            </a:lvl1pPr>
+          </a:lstStyle>
+          <a:p>
+            <a:r>
+              <a:rPr lang="en-US" i="1" dirty="0"/>
+              <a:t>Submits</a:t>
+            </a:r>
+          </a:p>
+        </p:txBody>
+      </p:sp>
+      <p:grpSp>
+        <p:nvGrpSpPr>
+          <p:cNvPr id="168" name="Group 167">
+            <a:extLst>
+              <a:ext uri="{FF2B5EF4-FFF2-40B4-BE49-F238E27FC236}">
+                <a16:creationId xmlns:a16="http://schemas.microsoft.com/office/drawing/2014/main" id="{5D9E12EC-AC5E-4219-B94A-ED018BA9C7D3}"/>
+              </a:ext>
+            </a:extLst>
+          </p:cNvPr>
+          <p:cNvGrpSpPr/>
+          <p:nvPr/>
+        </p:nvGrpSpPr>
+        <p:grpSpPr>
+          <a:xfrm>
+            <a:off x="4612320" y="2080583"/>
+            <a:ext cx="967636" cy="347806"/>
+            <a:chOff x="4890675" y="-65051"/>
+            <a:chExt cx="949337" cy="294683"/>
+          </a:xfrm>
+        </p:grpSpPr>
+        <p:cxnSp>
+          <p:nvCxnSpPr>
+            <p:cNvPr id="169" name="Straight Arrow Connector 168">
+              <a:extLst>
+                <a:ext uri="{FF2B5EF4-FFF2-40B4-BE49-F238E27FC236}">
+                  <a16:creationId xmlns:a16="http://schemas.microsoft.com/office/drawing/2014/main" id="{AFACBABD-DD0A-46CB-8D62-4BDE458CAD1B}"/>
+                </a:ext>
+              </a:extLst>
+            </p:cNvPr>
+            <p:cNvCxnSpPr>
+              <a:cxnSpLocks/>
+            </p:cNvCxnSpPr>
+            <p:nvPr/>
+          </p:nvCxnSpPr>
+          <p:spPr>
+            <a:xfrm>
+              <a:off x="4932977" y="-5367"/>
+              <a:ext cx="0" cy="234999"/>
+            </a:xfrm>
+            <a:prstGeom prst="straightConnector1">
+              <a:avLst/>
+            </a:prstGeom>
+            <a:ln w="38100">
+              <a:tailEnd type="triangle"/>
+            </a:ln>
+          </p:spPr>
+          <p:style>
+            <a:lnRef idx="3">
+              <a:schemeClr val="dk1"/>
+            </a:lnRef>
+            <a:fillRef idx="0">
+              <a:schemeClr val="dk1"/>
+            </a:fillRef>
+            <a:effectRef idx="2">
+              <a:schemeClr val="dk1"/>
+            </a:effectRef>
+            <a:fontRef idx="minor">
+              <a:schemeClr val="tx1"/>
+            </a:fontRef>
+          </p:style>
+        </p:cxnSp>
+        <p:sp>
+          <p:nvSpPr>
+            <p:cNvPr id="170" name="TextBox 169">
+              <a:extLst>
+                <a:ext uri="{FF2B5EF4-FFF2-40B4-BE49-F238E27FC236}">
+                  <a16:creationId xmlns:a16="http://schemas.microsoft.com/office/drawing/2014/main" id="{D19B816E-1C2A-4A5F-9A48-C52A1D273C60}"/>
+                </a:ext>
+              </a:extLst>
+            </p:cNvPr>
+            <p:cNvSpPr txBox="1"/>
+            <p:nvPr/>
+          </p:nvSpPr>
+          <p:spPr>
+            <a:xfrm>
+              <a:off x="4890675" y="-65051"/>
+              <a:ext cx="949337" cy="234692"/>
+            </a:xfrm>
+            <a:prstGeom prst="rect">
+              <a:avLst/>
+            </a:prstGeom>
+            <a:noFill/>
+          </p:spPr>
+          <p:txBody>
+            <a:bodyPr wrap="square" rtlCol="0">
+              <a:spAutoFit/>
+            </a:bodyPr>
+            <a:lstStyle>
+              <a:defPPr>
+                <a:defRPr lang="en-US"/>
+              </a:defPPr>
+              <a:lvl1pPr>
+                <a:defRPr sz="1200">
+                  <a:latin typeface="Arial" panose="020B0604020202020204" pitchFamily="34" charset="0"/>
+                  <a:cs typeface="Arial" panose="020B0604020202020204" pitchFamily="34" charset="0"/>
+                </a:defRPr>
+              </a:lvl1pPr>
+            </a:lstStyle>
+            <a:p>
+              <a:r>
+                <a:rPr lang="en-US" i="1" dirty="0"/>
+                <a:t>Generate</a:t>
+              </a:r>
+            </a:p>
+          </p:txBody>
+        </p:sp>
+      </p:grpSp>
+      <p:grpSp>
+        <p:nvGrpSpPr>
+          <p:cNvPr id="171" name="Group 170">
+            <a:extLst>
+              <a:ext uri="{FF2B5EF4-FFF2-40B4-BE49-F238E27FC236}">
+                <a16:creationId xmlns:a16="http://schemas.microsoft.com/office/drawing/2014/main" id="{E87A19A4-222A-4C88-B4D5-27135F50C398}"/>
+              </a:ext>
+            </a:extLst>
+          </p:cNvPr>
+          <p:cNvGrpSpPr/>
+          <p:nvPr/>
+        </p:nvGrpSpPr>
+        <p:grpSpPr>
+          <a:xfrm>
+            <a:off x="4445819" y="3797638"/>
+            <a:ext cx="911115" cy="276999"/>
+            <a:chOff x="4864836" y="153435"/>
+            <a:chExt cx="1079433" cy="276999"/>
+          </a:xfrm>
+        </p:grpSpPr>
+        <p:cxnSp>
+          <p:nvCxnSpPr>
+            <p:cNvPr id="172" name="Straight Arrow Connector 171">
+              <a:extLst>
+                <a:ext uri="{FF2B5EF4-FFF2-40B4-BE49-F238E27FC236}">
+                  <a16:creationId xmlns:a16="http://schemas.microsoft.com/office/drawing/2014/main" id="{B63F39D1-4CC6-4FEE-A41B-B645F092FA54}"/>
+                </a:ext>
+              </a:extLst>
+            </p:cNvPr>
+            <p:cNvCxnSpPr>
+              <a:cxnSpLocks/>
+            </p:cNvCxnSpPr>
+            <p:nvPr/>
+          </p:nvCxnSpPr>
+          <p:spPr>
+            <a:xfrm>
+              <a:off x="4864836" y="419586"/>
+              <a:ext cx="685800" cy="0"/>
+            </a:xfrm>
+            <a:prstGeom prst="straightConnector1">
+              <a:avLst/>
+            </a:prstGeom>
+            <a:ln w="38100">
+              <a:tailEnd type="triangle"/>
+            </a:ln>
+          </p:spPr>
+          <p:style>
+            <a:lnRef idx="3">
+              <a:schemeClr val="dk1"/>
+            </a:lnRef>
+            <a:fillRef idx="0">
+              <a:schemeClr val="dk1"/>
+            </a:fillRef>
+            <a:effectRef idx="2">
+              <a:schemeClr val="dk1"/>
+            </a:effectRef>
+            <a:fontRef idx="minor">
+              <a:schemeClr val="tx1"/>
+            </a:fontRef>
+          </p:style>
+        </p:cxnSp>
+        <p:sp>
+          <p:nvSpPr>
+            <p:cNvPr id="173" name="TextBox 172">
+              <a:extLst>
+                <a:ext uri="{FF2B5EF4-FFF2-40B4-BE49-F238E27FC236}">
+                  <a16:creationId xmlns:a16="http://schemas.microsoft.com/office/drawing/2014/main" id="{47E70B61-2A33-4F02-B323-15F6B03B118A}"/>
+                </a:ext>
+              </a:extLst>
+            </p:cNvPr>
+            <p:cNvSpPr txBox="1"/>
+            <p:nvPr/>
+          </p:nvSpPr>
+          <p:spPr>
+            <a:xfrm>
+              <a:off x="4915231" y="153435"/>
+              <a:ext cx="1029038" cy="276999"/>
+            </a:xfrm>
+            <a:prstGeom prst="rect">
+              <a:avLst/>
+            </a:prstGeom>
+            <a:noFill/>
+          </p:spPr>
+          <p:txBody>
+            <a:bodyPr wrap="square" rtlCol="0">
+              <a:spAutoFit/>
+            </a:bodyPr>
+            <a:lstStyle>
+              <a:defPPr>
+                <a:defRPr lang="en-US"/>
+              </a:defPPr>
+              <a:lvl1pPr>
+                <a:defRPr sz="1200">
+                  <a:latin typeface="Arial" panose="020B0604020202020204" pitchFamily="34" charset="0"/>
+                  <a:cs typeface="Arial" panose="020B0604020202020204" pitchFamily="34" charset="0"/>
+                </a:defRPr>
+              </a:lvl1pPr>
+            </a:lstStyle>
+            <a:p>
+              <a:r>
+                <a:rPr lang="en-US" i="1" dirty="0"/>
+                <a:t>with</a:t>
+              </a:r>
+            </a:p>
+          </p:txBody>
+        </p:sp>
+      </p:grpSp>
+      <p:sp>
+        <p:nvSpPr>
+          <p:cNvPr id="1033" name="Left Bracket 1032">
+            <a:extLst>
+              <a:ext uri="{FF2B5EF4-FFF2-40B4-BE49-F238E27FC236}">
+                <a16:creationId xmlns:a16="http://schemas.microsoft.com/office/drawing/2014/main" id="{F19531E0-BDA4-43BB-8CDF-EBACDF43CDA2}"/>
+              </a:ext>
+            </a:extLst>
+          </p:cNvPr>
+          <p:cNvSpPr/>
+          <p:nvPr/>
+        </p:nvSpPr>
+        <p:spPr>
+          <a:xfrm rot="16200000" flipH="1">
+            <a:off x="4628488" y="2794423"/>
+            <a:ext cx="226977" cy="1917017"/>
+          </a:xfrm>
+          <a:prstGeom prst="leftBracket">
+            <a:avLst>
+              <a:gd name="adj" fmla="val 156231"/>
+            </a:avLst>
+          </a:prstGeom>
+          <a:ln w="38100">
+            <a:headEnd type="none" w="med" len="med"/>
+            <a:tailEnd type="none" w="med" len="med"/>
+          </a:ln>
+        </p:spPr>
+        <p:style>
+          <a:lnRef idx="3">
+            <a:schemeClr val="dk1"/>
+          </a:lnRef>
+          <a:fillRef idx="0">
+            <a:schemeClr val="dk1"/>
+          </a:fillRef>
+          <a:effectRef idx="2">
+            <a:schemeClr val="dk1"/>
+          </a:effectRef>
+          <a:fontRef idx="minor">
+            <a:schemeClr val="tx1"/>
+          </a:fontRef>
+        </p:style>
+        <p:txBody>
+          <a:bodyPr rtlCol="0" anchor="ctr"/>
+          <a:lstStyle/>
+          <a:p>
+            <a:pPr algn="ctr"/>
+            <a:endParaRPr lang="en-US"/>
+          </a:p>
+        </p:txBody>
+      </p:sp>
+      <p:cxnSp>
+        <p:nvCxnSpPr>
+          <p:cNvPr id="192" name="Straight Arrow Connector 191">
+            <a:extLst>
+              <a:ext uri="{FF2B5EF4-FFF2-40B4-BE49-F238E27FC236}">
+                <a16:creationId xmlns:a16="http://schemas.microsoft.com/office/drawing/2014/main" id="{632A7BEF-8273-452E-A1B8-F5C0D8F8C7A6}"/>
+              </a:ext>
+            </a:extLst>
+          </p:cNvPr>
+          <p:cNvCxnSpPr>
+            <a:cxnSpLocks/>
+          </p:cNvCxnSpPr>
+          <p:nvPr/>
+        </p:nvCxnSpPr>
+        <p:spPr>
+          <a:xfrm flipH="1">
+            <a:off x="3460681" y="2850571"/>
+            <a:ext cx="904628" cy="0"/>
+          </a:xfrm>
+          <a:prstGeom prst="straightConnector1">
+            <a:avLst/>
+          </a:prstGeom>
+          <a:ln w="38100">
+            <a:headEnd type="triangle" w="med" len="med"/>
+            <a:tailEnd type="none" w="med" len="med"/>
+          </a:ln>
+        </p:spPr>
+        <p:style>
+          <a:lnRef idx="3">
+            <a:schemeClr val="dk1"/>
+          </a:lnRef>
+          <a:fillRef idx="0">
+            <a:schemeClr val="dk1"/>
+          </a:fillRef>
+          <a:effectRef idx="2">
+            <a:schemeClr val="dk1"/>
+          </a:effectRef>
+          <a:fontRef idx="minor">
+            <a:schemeClr val="tx1"/>
+          </a:fontRef>
+        </p:style>
+      </p:cxnSp>
+      <p:sp>
+        <p:nvSpPr>
+          <p:cNvPr id="193" name="TextBox 192">
+            <a:extLst>
+              <a:ext uri="{FF2B5EF4-FFF2-40B4-BE49-F238E27FC236}">
+                <a16:creationId xmlns:a16="http://schemas.microsoft.com/office/drawing/2014/main" id="{01BF18D4-6FEF-440C-98FB-013394D7F33B}"/>
+              </a:ext>
+            </a:extLst>
+          </p:cNvPr>
+          <p:cNvSpPr txBox="1"/>
+          <p:nvPr/>
+        </p:nvSpPr>
+        <p:spPr>
+          <a:xfrm>
+            <a:off x="3422833" y="2576850"/>
+            <a:ext cx="883575" cy="276999"/>
+          </a:xfrm>
+          <a:prstGeom prst="rect">
+            <a:avLst/>
+          </a:prstGeom>
+          <a:noFill/>
+        </p:spPr>
+        <p:txBody>
+          <a:bodyPr wrap="none" rtlCol="0">
+            <a:spAutoFit/>
+          </a:bodyPr>
+          <a:lstStyle>
+            <a:defPPr>
+              <a:defRPr lang="en-US"/>
+            </a:defPPr>
+            <a:lvl1pPr>
+              <a:defRPr sz="1200">
+                <a:latin typeface="Arial" panose="020B0604020202020204" pitchFamily="34" charset="0"/>
+                <a:cs typeface="Arial" panose="020B0604020202020204" pitchFamily="34" charset="0"/>
+              </a:defRPr>
+            </a:lvl1pPr>
+          </a:lstStyle>
+          <a:p>
+            <a:r>
+              <a:rPr lang="en-US" i="1" dirty="0"/>
+              <a:t>Organizes</a:t>
+            </a:r>
+          </a:p>
+        </p:txBody>
+      </p:sp>
+      <p:cxnSp>
+        <p:nvCxnSpPr>
+          <p:cNvPr id="202" name="Straight Connector 201">
+            <a:extLst>
+              <a:ext uri="{FF2B5EF4-FFF2-40B4-BE49-F238E27FC236}">
+                <a16:creationId xmlns:a16="http://schemas.microsoft.com/office/drawing/2014/main" id="{412345DC-6D92-454F-B9F2-4E0B75D276B1}"/>
+              </a:ext>
+            </a:extLst>
+          </p:cNvPr>
+          <p:cNvCxnSpPr>
+            <a:cxnSpLocks/>
+          </p:cNvCxnSpPr>
+          <p:nvPr/>
+        </p:nvCxnSpPr>
+        <p:spPr>
+          <a:xfrm flipV="1">
+            <a:off x="2489771" y="4478022"/>
+            <a:ext cx="3655848" cy="16409"/>
+          </a:xfrm>
+          <a:prstGeom prst="line">
+            <a:avLst/>
+          </a:prstGeom>
+          <a:noFill/>
+          <a:ln>
+            <a:prstDash val="lgDash"/>
+          </a:ln>
+        </p:spPr>
+        <p:style>
+          <a:lnRef idx="2">
+            <a:schemeClr val="accent1">
+              <a:shade val="50000"/>
+            </a:schemeClr>
+          </a:lnRef>
+          <a:fillRef idx="1">
+            <a:schemeClr val="accent1"/>
+          </a:fillRef>
+          <a:effectRef idx="0">
+            <a:schemeClr val="accent1"/>
+          </a:effectRef>
+          <a:fontRef idx="minor">
+            <a:schemeClr val="lt1"/>
+          </a:fontRef>
+        </p:style>
+      </p:cxnSp>
+    </p:spTree>
+    <p:extLst>
+      <p:ext uri="{BB962C8B-B14F-4D97-AF65-F5344CB8AC3E}">
+        <p14:creationId xmlns:p14="http://schemas.microsoft.com/office/powerpoint/2010/main" val="2095290232"/>
+      </p:ext>
+    </p:extLst>
+  </p:cSld>
+  <p:clrMapOvr>
+    <a:masterClrMapping/>
+  </p:clrMapOvr>
+</p:sld>
+</file>
+
+<file path=ppt/slides/slide2.xml><?xml version="1.0" encoding="utf-8"?>
 <p:sld xmlns:a="http://schemas.openxmlformats.org/drawingml/2006/main" xmlns:r="http://schemas.openxmlformats.org/officeDocument/2006/relationships" xmlns:p="http://schemas.openxmlformats.org/presentationml/2006/main">
   <p:cSld>
     <p:spTree>
@@ -5692,10 +9587,46 @@
           </a:fontRef>
         </p:style>
       </p:cxnSp>
+      <p:sp>
+        <p:nvSpPr>
+          <p:cNvPr id="2" name="TextBox 1">
+            <a:extLst>
+              <a:ext uri="{FF2B5EF4-FFF2-40B4-BE49-F238E27FC236}">
+                <a16:creationId xmlns:a16="http://schemas.microsoft.com/office/drawing/2014/main" id="{F16CA60A-5320-43BC-842E-F444E95EBAB1}"/>
+              </a:ext>
+            </a:extLst>
+          </p:cNvPr>
+          <p:cNvSpPr txBox="1"/>
+          <p:nvPr/>
+        </p:nvSpPr>
+        <p:spPr>
+          <a:xfrm>
+            <a:off x="1197374" y="4572000"/>
+            <a:ext cx="1052468" cy="369332"/>
+          </a:xfrm>
+          <a:prstGeom prst="rect">
+            <a:avLst/>
+          </a:prstGeom>
+          <a:noFill/>
+        </p:spPr>
+        <p:txBody>
+          <a:bodyPr wrap="none" rtlCol="0">
+            <a:spAutoFit/>
+          </a:bodyPr>
+          <a:lstStyle/>
+          <a:p>
+            <a:pPr algn="ctr"/>
+            <a:r>
+              <a:rPr lang="en-US" dirty="0"/>
+              <a:t>Version 2</a:t>
+            </a:r>
+          </a:p>
+        </p:txBody>
+      </p:sp>
     </p:spTree>
     <p:extLst>
       <p:ext uri="{BB962C8B-B14F-4D97-AF65-F5344CB8AC3E}">
-        <p14:creationId xmlns:p14="http://schemas.microsoft.com/office/powerpoint/2010/main" val="2095290232"/>
+        <p14:creationId xmlns:p14="http://schemas.microsoft.com/office/powerpoint/2010/main" val="979404603"/>
       </p:ext>
     </p:extLst>
   </p:cSld>
@@ -5705,7 +9636,7 @@
 </p:sld>
 </file>
 
-<file path=ppt/slides/slide2.xml><?xml version="1.0" encoding="utf-8"?>
+<file path=ppt/slides/slide3.xml><?xml version="1.0" encoding="utf-8"?>
 <p:sld xmlns:a="http://schemas.openxmlformats.org/drawingml/2006/main" xmlns:r="http://schemas.openxmlformats.org/officeDocument/2006/relationships" xmlns:p="http://schemas.openxmlformats.org/presentationml/2006/main">
   <p:cSld>
     <p:spTree>
@@ -7283,7 +11214,7 @@
 </p:sld>
 </file>
 
-<file path=ppt/slides/slide3.xml><?xml version="1.0" encoding="utf-8"?>
+<file path=ppt/slides/slide4.xml><?xml version="1.0" encoding="utf-8"?>
 <p:sld xmlns:a="http://schemas.openxmlformats.org/drawingml/2006/main" xmlns:r="http://schemas.openxmlformats.org/officeDocument/2006/relationships" xmlns:p="http://schemas.openxmlformats.org/presentationml/2006/main">
   <p:cSld>
     <p:spTree>

</xml_diff>